<commit_message>
Minor edit to new pipeline process image
</commit_message>
<xml_diff>
--- a/images/MappingTheProcess_15-12-20.pptx
+++ b/images/MappingTheProcess_15-12-20.pptx
@@ -105,6 +105,11 @@
       </a:defRPr>
     </a:lvl9pPr>
   </p:defaultTextStyle>
+  <p:extLst>
+    <p:ext uri="{EFAFB233-063F-42B5-8137-9DF3F51BA10A}">
+      <p15:sldGuideLst xmlns:p15="http://schemas.microsoft.com/office/powerpoint/2012/main"/>
+    </p:ext>
+  </p:extLst>
 </p:presentation>
 </file>
 
@@ -257,7 +262,7 @@
           <a:p>
             <a:fld id="{128E1D03-EC04-4A0A-AF1E-D1BDA5159C2C}" type="datetimeFigureOut">
               <a:rPr lang="en-GB" smtClean="0"/>
-              <a:t>15/12/2020</a:t>
+              <a:t>16/12/2020</a:t>
             </a:fld>
             <a:endParaRPr lang="en-GB"/>
           </a:p>
@@ -457,7 +462,7 @@
           <a:p>
             <a:fld id="{128E1D03-EC04-4A0A-AF1E-D1BDA5159C2C}" type="datetimeFigureOut">
               <a:rPr lang="en-GB" smtClean="0"/>
-              <a:t>15/12/2020</a:t>
+              <a:t>16/12/2020</a:t>
             </a:fld>
             <a:endParaRPr lang="en-GB"/>
           </a:p>
@@ -667,7 +672,7 @@
           <a:p>
             <a:fld id="{128E1D03-EC04-4A0A-AF1E-D1BDA5159C2C}" type="datetimeFigureOut">
               <a:rPr lang="en-GB" smtClean="0"/>
-              <a:t>15/12/2020</a:t>
+              <a:t>16/12/2020</a:t>
             </a:fld>
             <a:endParaRPr lang="en-GB"/>
           </a:p>
@@ -867,7 +872,7 @@
           <a:p>
             <a:fld id="{128E1D03-EC04-4A0A-AF1E-D1BDA5159C2C}" type="datetimeFigureOut">
               <a:rPr lang="en-GB" smtClean="0"/>
-              <a:t>15/12/2020</a:t>
+              <a:t>16/12/2020</a:t>
             </a:fld>
             <a:endParaRPr lang="en-GB"/>
           </a:p>
@@ -1143,7 +1148,7 @@
           <a:p>
             <a:fld id="{128E1D03-EC04-4A0A-AF1E-D1BDA5159C2C}" type="datetimeFigureOut">
               <a:rPr lang="en-GB" smtClean="0"/>
-              <a:t>15/12/2020</a:t>
+              <a:t>16/12/2020</a:t>
             </a:fld>
             <a:endParaRPr lang="en-GB"/>
           </a:p>
@@ -1411,7 +1416,7 @@
           <a:p>
             <a:fld id="{128E1D03-EC04-4A0A-AF1E-D1BDA5159C2C}" type="datetimeFigureOut">
               <a:rPr lang="en-GB" smtClean="0"/>
-              <a:t>15/12/2020</a:t>
+              <a:t>16/12/2020</a:t>
             </a:fld>
             <a:endParaRPr lang="en-GB"/>
           </a:p>
@@ -1826,7 +1831,7 @@
           <a:p>
             <a:fld id="{128E1D03-EC04-4A0A-AF1E-D1BDA5159C2C}" type="datetimeFigureOut">
               <a:rPr lang="en-GB" smtClean="0"/>
-              <a:t>15/12/2020</a:t>
+              <a:t>16/12/2020</a:t>
             </a:fld>
             <a:endParaRPr lang="en-GB"/>
           </a:p>
@@ -1968,7 +1973,7 @@
           <a:p>
             <a:fld id="{128E1D03-EC04-4A0A-AF1E-D1BDA5159C2C}" type="datetimeFigureOut">
               <a:rPr lang="en-GB" smtClean="0"/>
-              <a:t>15/12/2020</a:t>
+              <a:t>16/12/2020</a:t>
             </a:fld>
             <a:endParaRPr lang="en-GB"/>
           </a:p>
@@ -2081,7 +2086,7 @@
           <a:p>
             <a:fld id="{128E1D03-EC04-4A0A-AF1E-D1BDA5159C2C}" type="datetimeFigureOut">
               <a:rPr lang="en-GB" smtClean="0"/>
-              <a:t>15/12/2020</a:t>
+              <a:t>16/12/2020</a:t>
             </a:fld>
             <a:endParaRPr lang="en-GB"/>
           </a:p>
@@ -2394,7 +2399,7 @@
           <a:p>
             <a:fld id="{128E1D03-EC04-4A0A-AF1E-D1BDA5159C2C}" type="datetimeFigureOut">
               <a:rPr lang="en-GB" smtClean="0"/>
-              <a:t>15/12/2020</a:t>
+              <a:t>16/12/2020</a:t>
             </a:fld>
             <a:endParaRPr lang="en-GB"/>
           </a:p>
@@ -2683,7 +2688,7 @@
           <a:p>
             <a:fld id="{128E1D03-EC04-4A0A-AF1E-D1BDA5159C2C}" type="datetimeFigureOut">
               <a:rPr lang="en-GB" smtClean="0"/>
-              <a:t>15/12/2020</a:t>
+              <a:t>16/12/2020</a:t>
             </a:fld>
             <a:endParaRPr lang="en-GB"/>
           </a:p>
@@ -2926,7 +2931,7 @@
           <a:p>
             <a:fld id="{128E1D03-EC04-4A0A-AF1E-D1BDA5159C2C}" type="datetimeFigureOut">
               <a:rPr lang="en-GB" smtClean="0"/>
-              <a:t>15/12/2020</a:t>
+              <a:t>16/12/2020</a:t>
             </a:fld>
             <a:endParaRPr lang="en-GB"/>
           </a:p>
@@ -6949,10 +6954,10 @@
         </p:nvGrpSpPr>
         <p:grpSpPr>
           <a:xfrm>
-            <a:off x="882254" y="617671"/>
-            <a:ext cx="10427492" cy="5962023"/>
-            <a:chOff x="882254" y="617671"/>
-            <a:chExt cx="10427492" cy="5962023"/>
+            <a:off x="635313" y="617671"/>
+            <a:ext cx="10674433" cy="5622659"/>
+            <a:chOff x="635313" y="617671"/>
+            <a:chExt cx="10674433" cy="5622659"/>
           </a:xfrm>
         </p:grpSpPr>
         <p:grpSp>
@@ -6969,9 +6974,9 @@
           </p:nvGrpSpPr>
           <p:grpSpPr>
             <a:xfrm>
-              <a:off x="1028826" y="5637674"/>
+              <a:off x="635313" y="5113612"/>
               <a:ext cx="1912783" cy="942020"/>
-              <a:chOff x="1396538" y="5003480"/>
+              <a:chOff x="1003025" y="4479418"/>
               <a:chExt cx="1912783" cy="942020"/>
             </a:xfrm>
           </p:grpSpPr>
@@ -6989,7 +6994,7 @@
             </p:nvSpPr>
             <p:spPr>
               <a:xfrm>
-                <a:off x="1396538" y="5003480"/>
+                <a:off x="1003025" y="4479418"/>
                 <a:ext cx="1912783" cy="942020"/>
               </a:xfrm>
               <a:prstGeom prst="rect">
@@ -7078,7 +7083,7 @@
             </p:blipFill>
             <p:spPr bwMode="auto">
               <a:xfrm>
-                <a:off x="2547582" y="5074460"/>
+                <a:off x="2154660" y="4535343"/>
                 <a:ext cx="715664" cy="830170"/>
               </a:xfrm>
               <a:prstGeom prst="rect">
@@ -9000,7 +9005,7 @@
           <p:spPr>
             <a:xfrm flipH="1">
               <a:off x="1591705" y="4307301"/>
-              <a:ext cx="2464" cy="745031"/>
+              <a:ext cx="2464" cy="806311"/>
             </a:xfrm>
             <a:prstGeom prst="straightConnector1">
               <a:avLst/>

</xml_diff>

<commit_message>
Update to process map to include data repository
</commit_message>
<xml_diff>
--- a/images/MappingTheProcess_15-12-20.pptx
+++ b/images/MappingTheProcess_15-12-20.pptx
@@ -262,7 +262,7 @@
           <a:p>
             <a:fld id="{128E1D03-EC04-4A0A-AF1E-D1BDA5159C2C}" type="datetimeFigureOut">
               <a:rPr lang="en-GB" smtClean="0"/>
-              <a:t>16/12/2020</a:t>
+              <a:t>17/12/2020</a:t>
             </a:fld>
             <a:endParaRPr lang="en-GB"/>
           </a:p>
@@ -462,7 +462,7 @@
           <a:p>
             <a:fld id="{128E1D03-EC04-4A0A-AF1E-D1BDA5159C2C}" type="datetimeFigureOut">
               <a:rPr lang="en-GB" smtClean="0"/>
-              <a:t>16/12/2020</a:t>
+              <a:t>17/12/2020</a:t>
             </a:fld>
             <a:endParaRPr lang="en-GB"/>
           </a:p>
@@ -672,7 +672,7 @@
           <a:p>
             <a:fld id="{128E1D03-EC04-4A0A-AF1E-D1BDA5159C2C}" type="datetimeFigureOut">
               <a:rPr lang="en-GB" smtClean="0"/>
-              <a:t>16/12/2020</a:t>
+              <a:t>17/12/2020</a:t>
             </a:fld>
             <a:endParaRPr lang="en-GB"/>
           </a:p>
@@ -872,7 +872,7 @@
           <a:p>
             <a:fld id="{128E1D03-EC04-4A0A-AF1E-D1BDA5159C2C}" type="datetimeFigureOut">
               <a:rPr lang="en-GB" smtClean="0"/>
-              <a:t>16/12/2020</a:t>
+              <a:t>17/12/2020</a:t>
             </a:fld>
             <a:endParaRPr lang="en-GB"/>
           </a:p>
@@ -1148,7 +1148,7 @@
           <a:p>
             <a:fld id="{128E1D03-EC04-4A0A-AF1E-D1BDA5159C2C}" type="datetimeFigureOut">
               <a:rPr lang="en-GB" smtClean="0"/>
-              <a:t>16/12/2020</a:t>
+              <a:t>17/12/2020</a:t>
             </a:fld>
             <a:endParaRPr lang="en-GB"/>
           </a:p>
@@ -1416,7 +1416,7 @@
           <a:p>
             <a:fld id="{128E1D03-EC04-4A0A-AF1E-D1BDA5159C2C}" type="datetimeFigureOut">
               <a:rPr lang="en-GB" smtClean="0"/>
-              <a:t>16/12/2020</a:t>
+              <a:t>17/12/2020</a:t>
             </a:fld>
             <a:endParaRPr lang="en-GB"/>
           </a:p>
@@ -1831,7 +1831,7 @@
           <a:p>
             <a:fld id="{128E1D03-EC04-4A0A-AF1E-D1BDA5159C2C}" type="datetimeFigureOut">
               <a:rPr lang="en-GB" smtClean="0"/>
-              <a:t>16/12/2020</a:t>
+              <a:t>17/12/2020</a:t>
             </a:fld>
             <a:endParaRPr lang="en-GB"/>
           </a:p>
@@ -1973,7 +1973,7 @@
           <a:p>
             <a:fld id="{128E1D03-EC04-4A0A-AF1E-D1BDA5159C2C}" type="datetimeFigureOut">
               <a:rPr lang="en-GB" smtClean="0"/>
-              <a:t>16/12/2020</a:t>
+              <a:t>17/12/2020</a:t>
             </a:fld>
             <a:endParaRPr lang="en-GB"/>
           </a:p>
@@ -2086,7 +2086,7 @@
           <a:p>
             <a:fld id="{128E1D03-EC04-4A0A-AF1E-D1BDA5159C2C}" type="datetimeFigureOut">
               <a:rPr lang="en-GB" smtClean="0"/>
-              <a:t>16/12/2020</a:t>
+              <a:t>17/12/2020</a:t>
             </a:fld>
             <a:endParaRPr lang="en-GB"/>
           </a:p>
@@ -2399,7 +2399,7 @@
           <a:p>
             <a:fld id="{128E1D03-EC04-4A0A-AF1E-D1BDA5159C2C}" type="datetimeFigureOut">
               <a:rPr lang="en-GB" smtClean="0"/>
-              <a:t>16/12/2020</a:t>
+              <a:t>17/12/2020</a:t>
             </a:fld>
             <a:endParaRPr lang="en-GB"/>
           </a:p>
@@ -2688,7 +2688,7 @@
           <a:p>
             <a:fld id="{128E1D03-EC04-4A0A-AF1E-D1BDA5159C2C}" type="datetimeFigureOut">
               <a:rPr lang="en-GB" smtClean="0"/>
-              <a:t>16/12/2020</a:t>
+              <a:t>17/12/2020</a:t>
             </a:fld>
             <a:endParaRPr lang="en-GB"/>
           </a:p>
@@ -2931,7 +2931,7 @@
           <a:p>
             <a:fld id="{128E1D03-EC04-4A0A-AF1E-D1BDA5159C2C}" type="datetimeFigureOut">
               <a:rPr lang="en-GB" smtClean="0"/>
-              <a:t>16/12/2020</a:t>
+              <a:t>17/12/2020</a:t>
             </a:fld>
             <a:endParaRPr lang="en-GB"/>
           </a:p>
@@ -6942,10 +6942,10 @@
       </p:grpSpPr>
       <p:grpSp>
         <p:nvGrpSpPr>
-          <p:cNvPr id="3" name="Group 2">
+          <p:cNvPr id="57" name="Group 56">
             <a:extLst>
               <a:ext uri="{FF2B5EF4-FFF2-40B4-BE49-F238E27FC236}">
-                <a16:creationId xmlns:a16="http://schemas.microsoft.com/office/drawing/2014/main" id="{BB61C5D8-E1DC-4500-BED3-C792915D209A}"/>
+                <a16:creationId xmlns:a16="http://schemas.microsoft.com/office/drawing/2014/main" id="{7902EEC3-B768-4D48-9782-3043E4D4C487}"/>
               </a:ext>
             </a:extLst>
           </p:cNvPr>
@@ -6954,18 +6954,1414 @@
         </p:nvGrpSpPr>
         <p:grpSpPr>
           <a:xfrm>
-            <a:off x="635313" y="617671"/>
-            <a:ext cx="10674433" cy="5622659"/>
-            <a:chOff x="635313" y="617671"/>
-            <a:chExt cx="10674433" cy="5622659"/>
+            <a:off x="635313" y="5113612"/>
+            <a:ext cx="1912783" cy="942020"/>
+            <a:chOff x="1003025" y="4479418"/>
+            <a:chExt cx="1912783" cy="942020"/>
+          </a:xfrm>
+        </p:grpSpPr>
+        <p:sp>
+          <p:nvSpPr>
+            <p:cNvPr id="58" name="Rectangle 57">
+              <a:extLst>
+                <a:ext uri="{FF2B5EF4-FFF2-40B4-BE49-F238E27FC236}">
+                  <a16:creationId xmlns:a16="http://schemas.microsoft.com/office/drawing/2014/main" id="{F6F7CB1A-54D5-496E-AC16-557FE9C68636}"/>
+                </a:ext>
+              </a:extLst>
+            </p:cNvPr>
+            <p:cNvSpPr/>
+            <p:nvPr/>
+          </p:nvSpPr>
+          <p:spPr>
+            <a:xfrm>
+              <a:off x="1003025" y="4479418"/>
+              <a:ext cx="1912783" cy="942020"/>
+            </a:xfrm>
+            <a:prstGeom prst="rect">
+              <a:avLst/>
+            </a:prstGeom>
+            <a:solidFill>
+              <a:schemeClr val="bg1">
+                <a:lumMod val="95000"/>
+              </a:schemeClr>
+            </a:solidFill>
+            <a:ln w="38100">
+              <a:solidFill>
+                <a:schemeClr val="bg1">
+                  <a:lumMod val="75000"/>
+                </a:schemeClr>
+              </a:solidFill>
+            </a:ln>
+          </p:spPr>
+          <p:style>
+            <a:lnRef idx="2">
+              <a:schemeClr val="accent1">
+                <a:shade val="50000"/>
+              </a:schemeClr>
+            </a:lnRef>
+            <a:fillRef idx="1">
+              <a:schemeClr val="accent1"/>
+            </a:fillRef>
+            <a:effectRef idx="0">
+              <a:schemeClr val="accent1"/>
+            </a:effectRef>
+            <a:fontRef idx="minor">
+              <a:schemeClr val="lt1"/>
+            </a:fontRef>
+          </p:style>
+          <p:txBody>
+            <a:bodyPr lIns="72000" tIns="0" rIns="0" bIns="0" rtlCol="0" anchor="t" anchorCtr="0"/>
+            <a:lstStyle/>
+            <a:p>
+              <a:r>
+                <a:rPr lang="en-GB" dirty="0">
+                  <a:solidFill>
+                    <a:schemeClr val="tx1"/>
+                  </a:solidFill>
+                </a:rPr>
+                <a:t>Interactive</a:t>
+              </a:r>
+            </a:p>
+            <a:p>
+              <a:r>
+                <a:rPr lang="en-GB" dirty="0">
+                  <a:solidFill>
+                    <a:schemeClr val="tx1"/>
+                  </a:solidFill>
+                </a:rPr>
+                <a:t>dashboard</a:t>
+              </a:r>
+            </a:p>
+          </p:txBody>
+        </p:sp>
+        <p:pic>
+          <p:nvPicPr>
+            <p:cNvPr id="59" name="Picture 8" descr="R for Interactivity: An Introduction to Shiny | Rutgers University Libraries">
+              <a:extLst>
+                <a:ext uri="{FF2B5EF4-FFF2-40B4-BE49-F238E27FC236}">
+                  <a16:creationId xmlns:a16="http://schemas.microsoft.com/office/drawing/2014/main" id="{57222108-238B-4458-BF2A-7E17FF440E9E}"/>
+                </a:ext>
+              </a:extLst>
+            </p:cNvPr>
+            <p:cNvPicPr>
+              <a:picLocks noChangeAspect="1" noChangeArrowheads="1"/>
+            </p:cNvPicPr>
+            <p:nvPr/>
+          </p:nvPicPr>
+          <p:blipFill>
+            <a:blip r:embed="rId2">
+              <a:extLst>
+                <a:ext uri="{28A0092B-C50C-407E-A947-70E740481C1C}">
+                  <a14:useLocalDpi xmlns:a14="http://schemas.microsoft.com/office/drawing/2010/main" val="0"/>
+                </a:ext>
+              </a:extLst>
+            </a:blip>
+            <a:srcRect/>
+            <a:stretch>
+              <a:fillRect/>
+            </a:stretch>
+          </p:blipFill>
+          <p:spPr bwMode="auto">
+            <a:xfrm>
+              <a:off x="2154660" y="4535343"/>
+              <a:ext cx="715664" cy="830170"/>
+            </a:xfrm>
+            <a:prstGeom prst="rect">
+              <a:avLst/>
+            </a:prstGeom>
+            <a:noFill/>
+            <a:extLst>
+              <a:ext uri="{909E8E84-426E-40DD-AFC4-6F175D3DCCD1}">
+                <a14:hiddenFill xmlns:a14="http://schemas.microsoft.com/office/drawing/2010/main">
+                  <a:solidFill>
+                    <a:srgbClr val="FFFFFF"/>
+                  </a:solidFill>
+                </a14:hiddenFill>
+              </a:ext>
+            </a:extLst>
+          </p:spPr>
+        </p:pic>
+      </p:grpSp>
+      <p:sp>
+        <p:nvSpPr>
+          <p:cNvPr id="4" name="Rectangle 3">
+            <a:extLst>
+              <a:ext uri="{FF2B5EF4-FFF2-40B4-BE49-F238E27FC236}">
+                <a16:creationId xmlns:a16="http://schemas.microsoft.com/office/drawing/2014/main" id="{B0F3923F-B223-41E2-84BE-DEA21F63EB68}"/>
+              </a:ext>
+            </a:extLst>
+          </p:cNvPr>
+          <p:cNvSpPr/>
+          <p:nvPr/>
+        </p:nvSpPr>
+        <p:spPr>
+          <a:xfrm>
+            <a:off x="2956404" y="941074"/>
+            <a:ext cx="2011680" cy="648483"/>
+          </a:xfrm>
+          <a:prstGeom prst="rect">
+            <a:avLst/>
+          </a:prstGeom>
+          <a:solidFill>
+            <a:schemeClr val="bg1">
+              <a:lumMod val="95000"/>
+            </a:schemeClr>
+          </a:solidFill>
+          <a:ln w="38100">
+            <a:solidFill>
+              <a:schemeClr val="bg1">
+                <a:lumMod val="75000"/>
+              </a:schemeClr>
+            </a:solidFill>
+          </a:ln>
+        </p:spPr>
+        <p:style>
+          <a:lnRef idx="2">
+            <a:schemeClr val="accent1">
+              <a:shade val="50000"/>
+            </a:schemeClr>
+          </a:lnRef>
+          <a:fillRef idx="1">
+            <a:schemeClr val="accent1"/>
+          </a:fillRef>
+          <a:effectRef idx="0">
+            <a:schemeClr val="accent1"/>
+          </a:effectRef>
+          <a:fontRef idx="minor">
+            <a:schemeClr val="lt1"/>
+          </a:fontRef>
+        </p:style>
+        <p:txBody>
+          <a:bodyPr lIns="0" tIns="0" rIns="0" bIns="0" rtlCol="0" anchor="ctr" anchorCtr="1"/>
+          <a:lstStyle/>
+          <a:p>
+            <a:pPr algn="ctr"/>
+            <a:r>
+              <a:rPr lang="en-GB" dirty="0">
+                <a:solidFill>
+                  <a:schemeClr val="tx1"/>
+                </a:solidFill>
+              </a:rPr>
+              <a:t>Download the data for the latest month</a:t>
+            </a:r>
+          </a:p>
+        </p:txBody>
+      </p:sp>
+      <p:grpSp>
+        <p:nvGrpSpPr>
+          <p:cNvPr id="9" name="Group 8">
+            <a:extLst>
+              <a:ext uri="{FF2B5EF4-FFF2-40B4-BE49-F238E27FC236}">
+                <a16:creationId xmlns:a16="http://schemas.microsoft.com/office/drawing/2014/main" id="{DE8E1BC6-3281-41C3-8AFD-D16895A2FCA9}"/>
+              </a:ext>
+            </a:extLst>
+          </p:cNvPr>
+          <p:cNvGrpSpPr/>
+          <p:nvPr/>
+        </p:nvGrpSpPr>
+        <p:grpSpPr>
+          <a:xfrm>
+            <a:off x="882254" y="617671"/>
+            <a:ext cx="1418904" cy="1660721"/>
+            <a:chOff x="1275768" y="815003"/>
+            <a:chExt cx="1418904" cy="1660721"/>
+          </a:xfrm>
+        </p:grpSpPr>
+        <p:sp>
+          <p:nvSpPr>
+            <p:cNvPr id="5" name="Flowchart: Magnetic Disk 4">
+              <a:extLst>
+                <a:ext uri="{FF2B5EF4-FFF2-40B4-BE49-F238E27FC236}">
+                  <a16:creationId xmlns:a16="http://schemas.microsoft.com/office/drawing/2014/main" id="{DD4F5DB3-4C2F-4914-B578-22F4281FE642}"/>
+                </a:ext>
+              </a:extLst>
+            </p:cNvPr>
+            <p:cNvSpPr/>
+            <p:nvPr/>
+          </p:nvSpPr>
+          <p:spPr>
+            <a:xfrm>
+              <a:off x="1275770" y="1911296"/>
+              <a:ext cx="1418902" cy="564428"/>
+            </a:xfrm>
+            <a:prstGeom prst="flowChartMagneticDisk">
+              <a:avLst/>
+            </a:prstGeom>
+            <a:solidFill>
+              <a:schemeClr val="bg1"/>
+            </a:solidFill>
+            <a:ln w="28575">
+              <a:solidFill>
+                <a:schemeClr val="accent2">
+                  <a:lumMod val="40000"/>
+                  <a:lumOff val="60000"/>
+                </a:schemeClr>
+              </a:solidFill>
+            </a:ln>
+          </p:spPr>
+          <p:style>
+            <a:lnRef idx="2">
+              <a:schemeClr val="accent1">
+                <a:shade val="50000"/>
+              </a:schemeClr>
+            </a:lnRef>
+            <a:fillRef idx="1">
+              <a:schemeClr val="accent1"/>
+            </a:fillRef>
+            <a:effectRef idx="0">
+              <a:schemeClr val="accent1"/>
+            </a:effectRef>
+            <a:fontRef idx="minor">
+              <a:schemeClr val="lt1"/>
+            </a:fontRef>
+          </p:style>
+          <p:txBody>
+            <a:bodyPr rtlCol="0" anchor="ctr"/>
+            <a:lstStyle/>
+            <a:p>
+              <a:pPr algn="ctr"/>
+              <a:endParaRPr lang="en-GB"/>
+            </a:p>
+          </p:txBody>
+        </p:sp>
+        <p:sp>
+          <p:nvSpPr>
+            <p:cNvPr id="6" name="Flowchart: Magnetic Disk 5">
+              <a:extLst>
+                <a:ext uri="{FF2B5EF4-FFF2-40B4-BE49-F238E27FC236}">
+                  <a16:creationId xmlns:a16="http://schemas.microsoft.com/office/drawing/2014/main" id="{D4039E79-D911-4D38-90CC-DAB29C9DBCA1}"/>
+                </a:ext>
+              </a:extLst>
+            </p:cNvPr>
+            <p:cNvSpPr/>
+            <p:nvPr/>
+          </p:nvSpPr>
+          <p:spPr>
+            <a:xfrm>
+              <a:off x="1275769" y="1545865"/>
+              <a:ext cx="1418902" cy="564428"/>
+            </a:xfrm>
+            <a:prstGeom prst="flowChartMagneticDisk">
+              <a:avLst/>
+            </a:prstGeom>
+            <a:solidFill>
+              <a:schemeClr val="bg1"/>
+            </a:solidFill>
+            <a:ln w="28575">
+              <a:solidFill>
+                <a:schemeClr val="accent2">
+                  <a:lumMod val="40000"/>
+                  <a:lumOff val="60000"/>
+                </a:schemeClr>
+              </a:solidFill>
+            </a:ln>
+          </p:spPr>
+          <p:style>
+            <a:lnRef idx="2">
+              <a:schemeClr val="accent1">
+                <a:shade val="50000"/>
+              </a:schemeClr>
+            </a:lnRef>
+            <a:fillRef idx="1">
+              <a:schemeClr val="accent1"/>
+            </a:fillRef>
+            <a:effectRef idx="0">
+              <a:schemeClr val="accent1"/>
+            </a:effectRef>
+            <a:fontRef idx="minor">
+              <a:schemeClr val="lt1"/>
+            </a:fontRef>
+          </p:style>
+          <p:txBody>
+            <a:bodyPr rtlCol="0" anchor="ctr"/>
+            <a:lstStyle/>
+            <a:p>
+              <a:pPr algn="ctr"/>
+              <a:endParaRPr lang="en-GB"/>
+            </a:p>
+          </p:txBody>
+        </p:sp>
+        <p:sp>
+          <p:nvSpPr>
+            <p:cNvPr id="7" name="Flowchart: Magnetic Disk 6">
+              <a:extLst>
+                <a:ext uri="{FF2B5EF4-FFF2-40B4-BE49-F238E27FC236}">
+                  <a16:creationId xmlns:a16="http://schemas.microsoft.com/office/drawing/2014/main" id="{FC6E351F-2DDA-496F-BDF2-BC44F2C7FEB5}"/>
+                </a:ext>
+              </a:extLst>
+            </p:cNvPr>
+            <p:cNvSpPr/>
+            <p:nvPr/>
+          </p:nvSpPr>
+          <p:spPr>
+            <a:xfrm>
+              <a:off x="1275769" y="1180434"/>
+              <a:ext cx="1418902" cy="564428"/>
+            </a:xfrm>
+            <a:prstGeom prst="flowChartMagneticDisk">
+              <a:avLst/>
+            </a:prstGeom>
+            <a:solidFill>
+              <a:schemeClr val="bg1"/>
+            </a:solidFill>
+            <a:ln w="28575">
+              <a:solidFill>
+                <a:schemeClr val="accent2">
+                  <a:lumMod val="40000"/>
+                  <a:lumOff val="60000"/>
+                </a:schemeClr>
+              </a:solidFill>
+            </a:ln>
+          </p:spPr>
+          <p:style>
+            <a:lnRef idx="2">
+              <a:schemeClr val="accent1">
+                <a:shade val="50000"/>
+              </a:schemeClr>
+            </a:lnRef>
+            <a:fillRef idx="1">
+              <a:schemeClr val="accent1"/>
+            </a:fillRef>
+            <a:effectRef idx="0">
+              <a:schemeClr val="accent1"/>
+            </a:effectRef>
+            <a:fontRef idx="minor">
+              <a:schemeClr val="lt1"/>
+            </a:fontRef>
+          </p:style>
+          <p:txBody>
+            <a:bodyPr rtlCol="0" anchor="ctr"/>
+            <a:lstStyle/>
+            <a:p>
+              <a:pPr algn="ctr"/>
+              <a:endParaRPr lang="en-GB"/>
+            </a:p>
+          </p:txBody>
+        </p:sp>
+        <p:sp>
+          <p:nvSpPr>
+            <p:cNvPr id="8" name="Flowchart: Magnetic Disk 7">
+              <a:extLst>
+                <a:ext uri="{FF2B5EF4-FFF2-40B4-BE49-F238E27FC236}">
+                  <a16:creationId xmlns:a16="http://schemas.microsoft.com/office/drawing/2014/main" id="{41F27AE0-BB5F-4DF1-BD08-D72C05532093}"/>
+                </a:ext>
+              </a:extLst>
+            </p:cNvPr>
+            <p:cNvSpPr/>
+            <p:nvPr/>
+          </p:nvSpPr>
+          <p:spPr>
+            <a:xfrm>
+              <a:off x="1275768" y="815003"/>
+              <a:ext cx="1418902" cy="564428"/>
+            </a:xfrm>
+            <a:prstGeom prst="flowChartMagneticDisk">
+              <a:avLst/>
+            </a:prstGeom>
+            <a:solidFill>
+              <a:schemeClr val="bg1"/>
+            </a:solidFill>
+            <a:ln w="28575">
+              <a:solidFill>
+                <a:schemeClr val="accent2">
+                  <a:lumMod val="40000"/>
+                  <a:lumOff val="60000"/>
+                </a:schemeClr>
+              </a:solidFill>
+            </a:ln>
+          </p:spPr>
+          <p:style>
+            <a:lnRef idx="2">
+              <a:schemeClr val="accent1">
+                <a:shade val="50000"/>
+              </a:schemeClr>
+            </a:lnRef>
+            <a:fillRef idx="1">
+              <a:schemeClr val="accent1"/>
+            </a:fillRef>
+            <a:effectRef idx="0">
+              <a:schemeClr val="accent1"/>
+            </a:effectRef>
+            <a:fontRef idx="minor">
+              <a:schemeClr val="lt1"/>
+            </a:fontRef>
+          </p:style>
+          <p:txBody>
+            <a:bodyPr rtlCol="0" anchor="ctr"/>
+            <a:lstStyle/>
+            <a:p>
+              <a:pPr algn="ctr"/>
+              <a:endParaRPr lang="en-GB"/>
+            </a:p>
+          </p:txBody>
+        </p:sp>
+      </p:grpSp>
+      <p:pic>
+        <p:nvPicPr>
+          <p:cNvPr id="1026" name="Picture 2" descr="ASYCUDA Logo">
+            <a:extLst>
+              <a:ext uri="{FF2B5EF4-FFF2-40B4-BE49-F238E27FC236}">
+                <a16:creationId xmlns:a16="http://schemas.microsoft.com/office/drawing/2014/main" id="{0A081277-6310-4F6A-851D-A84DB4EC8C75}"/>
+              </a:ext>
+            </a:extLst>
+          </p:cNvPr>
+          <p:cNvPicPr>
+            <a:picLocks noChangeAspect="1" noChangeArrowheads="1"/>
+          </p:cNvPicPr>
+          <p:nvPr/>
+        </p:nvPicPr>
+        <p:blipFill>
+          <a:blip r:embed="rId3">
+            <a:extLst>
+              <a:ext uri="{28A0092B-C50C-407E-A947-70E740481C1C}">
+                <a14:useLocalDpi xmlns:a14="http://schemas.microsoft.com/office/drawing/2010/main" val="0"/>
+              </a:ext>
+            </a:extLst>
+          </a:blip>
+          <a:srcRect/>
+          <a:stretch>
+            <a:fillRect/>
+          </a:stretch>
+        </p:blipFill>
+        <p:spPr bwMode="auto">
+          <a:xfrm>
+            <a:off x="887421" y="1336297"/>
+            <a:ext cx="1418903" cy="306504"/>
+          </a:xfrm>
+          <a:prstGeom prst="rect">
+            <a:avLst/>
+          </a:prstGeom>
+          <a:noFill/>
+          <a:extLst>
+            <a:ext uri="{909E8E84-426E-40DD-AFC4-6F175D3DCCD1}">
+              <a14:hiddenFill xmlns:a14="http://schemas.microsoft.com/office/drawing/2010/main">
+                <a:solidFill>
+                  <a:srgbClr val="FFFFFF"/>
+                </a:solidFill>
+              </a14:hiddenFill>
+            </a:ext>
+          </a:extLst>
+        </p:spPr>
+      </p:pic>
+      <p:cxnSp>
+        <p:nvCxnSpPr>
+          <p:cNvPr id="12" name="Straight Connector 11">
+            <a:extLst>
+              <a:ext uri="{FF2B5EF4-FFF2-40B4-BE49-F238E27FC236}">
+                <a16:creationId xmlns:a16="http://schemas.microsoft.com/office/drawing/2014/main" id="{745EFF79-6834-4AB1-8F89-629C878B86B1}"/>
+              </a:ext>
+            </a:extLst>
+          </p:cNvPr>
+          <p:cNvCxnSpPr>
+            <a:cxnSpLocks/>
+            <a:stCxn id="4" idx="1"/>
+            <a:endCxn id="7" idx="4"/>
+          </p:cNvCxnSpPr>
+          <p:nvPr/>
+        </p:nvCxnSpPr>
+        <p:spPr>
+          <a:xfrm flipH="1">
+            <a:off x="2301157" y="1265316"/>
+            <a:ext cx="655247" cy="0"/>
+          </a:xfrm>
+          <a:prstGeom prst="line">
+            <a:avLst/>
+          </a:prstGeom>
+          <a:ln w="28575">
+            <a:solidFill>
+              <a:schemeClr val="tx1"/>
+            </a:solidFill>
+            <a:prstDash val="sysDash"/>
+            <a:headEnd type="triangle" w="med" len="med"/>
+            <a:tailEnd type="none" w="med" len="med"/>
+          </a:ln>
+        </p:spPr>
+        <p:style>
+          <a:lnRef idx="1">
+            <a:schemeClr val="accent1"/>
+          </a:lnRef>
+          <a:fillRef idx="0">
+            <a:schemeClr val="accent1"/>
+          </a:fillRef>
+          <a:effectRef idx="0">
+            <a:schemeClr val="accent1"/>
+          </a:effectRef>
+          <a:fontRef idx="minor">
+            <a:schemeClr val="tx1"/>
+          </a:fontRef>
+        </p:style>
+      </p:cxnSp>
+      <p:grpSp>
+        <p:nvGrpSpPr>
+          <p:cNvPr id="29" name="Group 28">
+            <a:extLst>
+              <a:ext uri="{FF2B5EF4-FFF2-40B4-BE49-F238E27FC236}">
+                <a16:creationId xmlns:a16="http://schemas.microsoft.com/office/drawing/2014/main" id="{0D711C5E-8138-43A0-AEE5-F5B20729EE84}"/>
+              </a:ext>
+            </a:extLst>
+          </p:cNvPr>
+          <p:cNvGrpSpPr/>
+          <p:nvPr/>
+        </p:nvGrpSpPr>
+        <p:grpSpPr>
+          <a:xfrm>
+            <a:off x="5530023" y="857515"/>
+            <a:ext cx="2455353" cy="815600"/>
+            <a:chOff x="6315421" y="2132873"/>
+            <a:chExt cx="2455353" cy="815600"/>
+          </a:xfrm>
+          <a:solidFill>
+            <a:schemeClr val="bg1">
+              <a:lumMod val="95000"/>
+            </a:schemeClr>
+          </a:solidFill>
+        </p:grpSpPr>
+        <p:sp>
+          <p:nvSpPr>
+            <p:cNvPr id="31" name="Rectangle 30">
+              <a:extLst>
+                <a:ext uri="{FF2B5EF4-FFF2-40B4-BE49-F238E27FC236}">
+                  <a16:creationId xmlns:a16="http://schemas.microsoft.com/office/drawing/2014/main" id="{C3405F75-90B3-46FD-A5AD-840C6FE663C6}"/>
+                </a:ext>
+              </a:extLst>
+            </p:cNvPr>
+            <p:cNvSpPr/>
+            <p:nvPr/>
+          </p:nvSpPr>
+          <p:spPr>
+            <a:xfrm>
+              <a:off x="6315421" y="2132873"/>
+              <a:ext cx="2455353" cy="815600"/>
+            </a:xfrm>
+            <a:prstGeom prst="rect">
+              <a:avLst/>
+            </a:prstGeom>
+            <a:grpFill/>
+            <a:ln w="38100">
+              <a:solidFill>
+                <a:schemeClr val="bg1">
+                  <a:lumMod val="75000"/>
+                </a:schemeClr>
+              </a:solidFill>
+            </a:ln>
+          </p:spPr>
+          <p:style>
+            <a:lnRef idx="2">
+              <a:schemeClr val="accent1">
+                <a:shade val="50000"/>
+              </a:schemeClr>
+            </a:lnRef>
+            <a:fillRef idx="1">
+              <a:schemeClr val="accent1"/>
+            </a:fillRef>
+            <a:effectRef idx="0">
+              <a:schemeClr val="accent1"/>
+            </a:effectRef>
+            <a:fontRef idx="minor">
+              <a:schemeClr val="lt1"/>
+            </a:fontRef>
+          </p:style>
+          <p:txBody>
+            <a:bodyPr lIns="72000" tIns="0" rIns="0" bIns="0" rtlCol="0" anchor="t" anchorCtr="0"/>
+            <a:lstStyle/>
+            <a:p>
+              <a:r>
+                <a:rPr lang="en-GB" dirty="0">
+                  <a:solidFill>
+                    <a:schemeClr val="tx1"/>
+                  </a:solidFill>
+                </a:rPr>
+                <a:t>Save the data as </a:t>
+              </a:r>
+            </a:p>
+            <a:p>
+              <a:r>
+                <a:rPr lang="en-GB" dirty="0">
+                  <a:solidFill>
+                    <a:schemeClr val="tx1"/>
+                  </a:solidFill>
+                </a:rPr>
+                <a:t>an excel file</a:t>
+              </a:r>
+            </a:p>
+          </p:txBody>
+        </p:sp>
+        <p:pic>
+          <p:nvPicPr>
+            <p:cNvPr id="28" name="Picture 2" descr="Microsoft Excel - Wikipedia">
+              <a:extLst>
+                <a:ext uri="{FF2B5EF4-FFF2-40B4-BE49-F238E27FC236}">
+                  <a16:creationId xmlns:a16="http://schemas.microsoft.com/office/drawing/2014/main" id="{FDA76825-181D-4EC8-B6A4-42845D5D93CD}"/>
+                </a:ext>
+              </a:extLst>
+            </p:cNvPr>
+            <p:cNvPicPr>
+              <a:picLocks noChangeAspect="1" noChangeArrowheads="1"/>
+            </p:cNvPicPr>
+            <p:nvPr/>
+          </p:nvPicPr>
+          <p:blipFill>
+            <a:blip r:embed="rId4">
+              <a:clrChange>
+                <a:clrFrom>
+                  <a:srgbClr val="000000">
+                    <a:alpha val="0"/>
+                  </a:srgbClr>
+                </a:clrFrom>
+                <a:clrTo>
+                  <a:srgbClr val="000000">
+                    <a:alpha val="0"/>
+                  </a:srgbClr>
+                </a:clrTo>
+              </a:clrChange>
+              <a:extLst>
+                <a:ext uri="{28A0092B-C50C-407E-A947-70E740481C1C}">
+                  <a14:useLocalDpi xmlns:a14="http://schemas.microsoft.com/office/drawing/2010/main" val="0"/>
+                </a:ext>
+              </a:extLst>
+            </a:blip>
+            <a:srcRect/>
+            <a:stretch>
+              <a:fillRect/>
+            </a:stretch>
+          </p:blipFill>
+          <p:spPr bwMode="auto">
+            <a:xfrm>
+              <a:off x="7921688" y="2160864"/>
+              <a:ext cx="821093" cy="760235"/>
+            </a:xfrm>
+            <a:prstGeom prst="rect">
+              <a:avLst/>
+            </a:prstGeom>
+            <a:grpFill/>
+            <a:ln>
+              <a:noFill/>
+            </a:ln>
+          </p:spPr>
+        </p:pic>
+      </p:grpSp>
+      <p:cxnSp>
+        <p:nvCxnSpPr>
+          <p:cNvPr id="34" name="Straight Arrow Connector 33">
+            <a:extLst>
+              <a:ext uri="{FF2B5EF4-FFF2-40B4-BE49-F238E27FC236}">
+                <a16:creationId xmlns:a16="http://schemas.microsoft.com/office/drawing/2014/main" id="{C56F6CE5-CD7D-4401-B301-E42AE3E552D4}"/>
+              </a:ext>
+            </a:extLst>
+          </p:cNvPr>
+          <p:cNvCxnSpPr>
+            <a:stCxn id="4" idx="3"/>
+            <a:endCxn id="31" idx="1"/>
+          </p:cNvCxnSpPr>
+          <p:nvPr/>
+        </p:nvCxnSpPr>
+        <p:spPr>
+          <a:xfrm flipV="1">
+            <a:off x="4968084" y="1265315"/>
+            <a:ext cx="561939" cy="1"/>
+          </a:xfrm>
+          <a:prstGeom prst="straightConnector1">
+            <a:avLst/>
+          </a:prstGeom>
+          <a:ln w="28575">
+            <a:solidFill>
+              <a:schemeClr val="tx1"/>
+            </a:solidFill>
+            <a:prstDash val="sysDash"/>
+            <a:tailEnd type="triangle"/>
+          </a:ln>
+        </p:spPr>
+        <p:style>
+          <a:lnRef idx="1">
+            <a:schemeClr val="accent1"/>
+          </a:lnRef>
+          <a:fillRef idx="0">
+            <a:schemeClr val="accent1"/>
+          </a:fillRef>
+          <a:effectRef idx="0">
+            <a:schemeClr val="accent1"/>
+          </a:effectRef>
+          <a:fontRef idx="minor">
+            <a:schemeClr val="tx1"/>
+          </a:fontRef>
+        </p:style>
+      </p:cxnSp>
+      <p:sp>
+        <p:nvSpPr>
+          <p:cNvPr id="37" name="Rectangle 36">
+            <a:extLst>
+              <a:ext uri="{FF2B5EF4-FFF2-40B4-BE49-F238E27FC236}">
+                <a16:creationId xmlns:a16="http://schemas.microsoft.com/office/drawing/2014/main" id="{4B395FCF-570C-48DD-A568-2108FD8FA957}"/>
+              </a:ext>
+            </a:extLst>
+          </p:cNvPr>
+          <p:cNvSpPr/>
+          <p:nvPr/>
+        </p:nvSpPr>
+        <p:spPr>
+          <a:xfrm>
+            <a:off x="4811170" y="2062331"/>
+            <a:ext cx="3893058" cy="1951871"/>
+          </a:xfrm>
+          <a:prstGeom prst="rect">
+            <a:avLst/>
+          </a:prstGeom>
+          <a:solidFill>
+            <a:schemeClr val="bg1">
+              <a:lumMod val="95000"/>
+            </a:schemeClr>
+          </a:solidFill>
+          <a:ln w="38100">
+            <a:solidFill>
+              <a:schemeClr val="bg1">
+                <a:lumMod val="75000"/>
+              </a:schemeClr>
+            </a:solidFill>
+          </a:ln>
+        </p:spPr>
+        <p:style>
+          <a:lnRef idx="2">
+            <a:schemeClr val="accent1">
+              <a:shade val="50000"/>
+            </a:schemeClr>
+          </a:lnRef>
+          <a:fillRef idx="1">
+            <a:schemeClr val="accent1"/>
+          </a:fillRef>
+          <a:effectRef idx="0">
+            <a:schemeClr val="accent1"/>
+          </a:effectRef>
+          <a:fontRef idx="minor">
+            <a:schemeClr val="lt1"/>
+          </a:fontRef>
+        </p:style>
+        <p:txBody>
+          <a:bodyPr lIns="72000" tIns="0" rIns="0" bIns="0" rtlCol="0" anchor="t" anchorCtr="0"/>
+          <a:lstStyle/>
+          <a:p>
+            <a:r>
+              <a:rPr lang="en-GB" dirty="0">
+                <a:solidFill>
+                  <a:schemeClr val="tx1"/>
+                </a:solidFill>
+              </a:rPr>
+              <a:t>Process and clean data:</a:t>
+            </a:r>
+          </a:p>
+          <a:p>
+            <a:pPr marL="285750" indent="-285750">
+              <a:buFont typeface="Arial" panose="020B0604020202020204" pitchFamily="34" charset="0"/>
+              <a:buChar char="•"/>
+            </a:pPr>
+            <a:r>
+              <a:rPr lang="en-GB" dirty="0">
+                <a:solidFill>
+                  <a:schemeClr val="tx1"/>
+                </a:solidFill>
+              </a:rPr>
+              <a:t>Format date columns</a:t>
+            </a:r>
+          </a:p>
+          <a:p>
+            <a:pPr marL="285750" indent="-285750">
+              <a:buFont typeface="Arial" panose="020B0604020202020204" pitchFamily="34" charset="0"/>
+              <a:buChar char="•"/>
+            </a:pPr>
+            <a:r>
+              <a:rPr lang="en-GB" dirty="0">
+                <a:solidFill>
+                  <a:schemeClr val="tx1"/>
+                </a:solidFill>
+              </a:rPr>
+              <a:t>Examine missing data</a:t>
+            </a:r>
+          </a:p>
+          <a:p>
+            <a:pPr marL="285750" indent="-285750">
+              <a:buFont typeface="Arial" panose="020B0604020202020204" pitchFamily="34" charset="0"/>
+              <a:buChar char="•"/>
+            </a:pPr>
+            <a:r>
+              <a:rPr lang="en-GB" dirty="0">
+                <a:solidFill>
+                  <a:schemeClr val="tx1"/>
+                </a:solidFill>
+              </a:rPr>
+              <a:t>Extract HS and SITC sub-codes</a:t>
+            </a:r>
+          </a:p>
+          <a:p>
+            <a:pPr marL="285750" indent="-285750">
+              <a:buFont typeface="Arial" panose="020B0604020202020204" pitchFamily="34" charset="0"/>
+              <a:buChar char="•"/>
+            </a:pPr>
+            <a:r>
+              <a:rPr lang="en-GB" dirty="0">
+                <a:solidFill>
+                  <a:schemeClr val="tx1"/>
+                </a:solidFill>
+              </a:rPr>
+              <a:t>Merge classification tables</a:t>
+            </a:r>
+          </a:p>
+          <a:p>
+            <a:pPr marL="285750" indent="-285750">
+              <a:buFont typeface="Arial" panose="020B0604020202020204" pitchFamily="34" charset="0"/>
+              <a:buChar char="•"/>
+            </a:pPr>
+            <a:r>
+              <a:rPr lang="en-GB" dirty="0">
+                <a:solidFill>
+                  <a:schemeClr val="tx1"/>
+                </a:solidFill>
+              </a:rPr>
+              <a:t>Check for missing classification codes</a:t>
+            </a:r>
+          </a:p>
+          <a:p>
+            <a:pPr marL="285750" indent="-285750">
+              <a:buFont typeface="Arial" panose="020B0604020202020204" pitchFamily="34" charset="0"/>
+              <a:buChar char="•"/>
+            </a:pPr>
+            <a:r>
+              <a:rPr lang="en-GB" dirty="0">
+                <a:solidFill>
+                  <a:schemeClr val="tx1"/>
+                </a:solidFill>
+              </a:rPr>
+              <a:t>Check for outliers</a:t>
+            </a:r>
+          </a:p>
+          <a:p>
+            <a:endParaRPr lang="en-GB" dirty="0">
+              <a:solidFill>
+                <a:schemeClr val="tx1"/>
+              </a:solidFill>
+            </a:endParaRPr>
+          </a:p>
+        </p:txBody>
+      </p:sp>
+      <p:cxnSp>
+        <p:nvCxnSpPr>
+          <p:cNvPr id="39" name="Straight Arrow Connector 38">
+            <a:extLst>
+              <a:ext uri="{FF2B5EF4-FFF2-40B4-BE49-F238E27FC236}">
+                <a16:creationId xmlns:a16="http://schemas.microsoft.com/office/drawing/2014/main" id="{BC117CA7-2521-47A4-8E41-30B9E7FA69F7}"/>
+              </a:ext>
+            </a:extLst>
+          </p:cNvPr>
+          <p:cNvCxnSpPr>
+            <a:cxnSpLocks/>
+            <a:stCxn id="31" idx="2"/>
+            <a:endCxn id="37" idx="0"/>
+          </p:cNvCxnSpPr>
+          <p:nvPr/>
+        </p:nvCxnSpPr>
+        <p:spPr>
+          <a:xfrm flipH="1">
+            <a:off x="6757699" y="1673115"/>
+            <a:ext cx="1" cy="389216"/>
+          </a:xfrm>
+          <a:prstGeom prst="straightConnector1">
+            <a:avLst/>
+          </a:prstGeom>
+          <a:ln w="28575">
+            <a:solidFill>
+              <a:schemeClr val="tx1"/>
+            </a:solidFill>
+            <a:prstDash val="sysDash"/>
+            <a:tailEnd type="triangle"/>
+          </a:ln>
+        </p:spPr>
+        <p:style>
+          <a:lnRef idx="1">
+            <a:schemeClr val="accent1"/>
+          </a:lnRef>
+          <a:fillRef idx="0">
+            <a:schemeClr val="accent1"/>
+          </a:fillRef>
+          <a:effectRef idx="0">
+            <a:schemeClr val="accent1"/>
+          </a:effectRef>
+          <a:fontRef idx="minor">
+            <a:schemeClr val="tx1"/>
+          </a:fontRef>
+        </p:style>
+      </p:cxnSp>
+      <p:sp>
+        <p:nvSpPr>
+          <p:cNvPr id="67" name="Rectangle 66">
+            <a:extLst>
+              <a:ext uri="{FF2B5EF4-FFF2-40B4-BE49-F238E27FC236}">
+                <a16:creationId xmlns:a16="http://schemas.microsoft.com/office/drawing/2014/main" id="{D940A257-2DBC-4329-A849-483DA0F6E234}"/>
+              </a:ext>
+            </a:extLst>
+          </p:cNvPr>
+          <p:cNvSpPr/>
+          <p:nvPr/>
+        </p:nvSpPr>
+        <p:spPr>
+          <a:xfrm>
+            <a:off x="9499978" y="2714024"/>
+            <a:ext cx="1809768" cy="648483"/>
+          </a:xfrm>
+          <a:prstGeom prst="rect">
+            <a:avLst/>
+          </a:prstGeom>
+          <a:solidFill>
+            <a:schemeClr val="bg1">
+              <a:lumMod val="95000"/>
+            </a:schemeClr>
+          </a:solidFill>
+          <a:ln w="38100">
+            <a:solidFill>
+              <a:srgbClr val="FF0000"/>
+            </a:solidFill>
+          </a:ln>
+        </p:spPr>
+        <p:style>
+          <a:lnRef idx="2">
+            <a:schemeClr val="accent1">
+              <a:shade val="50000"/>
+            </a:schemeClr>
+          </a:lnRef>
+          <a:fillRef idx="1">
+            <a:schemeClr val="accent1"/>
+          </a:fillRef>
+          <a:effectRef idx="0">
+            <a:schemeClr val="accent1"/>
+          </a:effectRef>
+          <a:fontRef idx="minor">
+            <a:schemeClr val="lt1"/>
+          </a:fontRef>
+        </p:style>
+        <p:txBody>
+          <a:bodyPr lIns="0" tIns="0" rIns="0" bIns="0" rtlCol="0" anchor="ctr" anchorCtr="1"/>
+          <a:lstStyle/>
+          <a:p>
+            <a:pPr algn="ctr"/>
+            <a:r>
+              <a:rPr lang="en-GB" dirty="0">
+                <a:solidFill>
+                  <a:schemeClr val="tx1"/>
+                </a:solidFill>
+              </a:rPr>
+              <a:t>Flag issues to report to customs</a:t>
+            </a:r>
+          </a:p>
+        </p:txBody>
+      </p:sp>
+      <p:pic>
+        <p:nvPicPr>
+          <p:cNvPr id="11" name="Graphic 10">
+            <a:extLst>
+              <a:ext uri="{FF2B5EF4-FFF2-40B4-BE49-F238E27FC236}">
+                <a16:creationId xmlns:a16="http://schemas.microsoft.com/office/drawing/2014/main" id="{23F6F2FD-B085-41FE-9C1F-20F540BEA938}"/>
+              </a:ext>
+            </a:extLst>
+          </p:cNvPr>
+          <p:cNvPicPr>
+            <a:picLocks noChangeAspect="1"/>
+          </p:cNvPicPr>
+          <p:nvPr/>
+        </p:nvPicPr>
+        <p:blipFill>
+          <a:blip r:embed="rId5">
+            <a:extLst>
+              <a:ext uri="{28A0092B-C50C-407E-A947-70E740481C1C}">
+                <a14:useLocalDpi xmlns:a14="http://schemas.microsoft.com/office/drawing/2010/main" val="0"/>
+              </a:ext>
+              <a:ext uri="{96DAC541-7B7A-43D3-8B79-37D633B846F1}">
+                <asvg:svgBlip xmlns:asvg="http://schemas.microsoft.com/office/drawing/2016/SVG/main" r:embed="rId6"/>
+              </a:ext>
+            </a:extLst>
+          </a:blip>
+          <a:stretch>
+            <a:fillRect/>
+          </a:stretch>
+        </p:blipFill>
+        <p:spPr>
+          <a:xfrm>
+            <a:off x="7780441" y="2115722"/>
+            <a:ext cx="887211" cy="687466"/>
+          </a:xfrm>
+          <a:prstGeom prst="rect">
+            <a:avLst/>
+          </a:prstGeom>
+        </p:spPr>
+      </p:pic>
+      <p:cxnSp>
+        <p:nvCxnSpPr>
+          <p:cNvPr id="95" name="Straight Arrow Connector 94">
+            <a:extLst>
+              <a:ext uri="{FF2B5EF4-FFF2-40B4-BE49-F238E27FC236}">
+                <a16:creationId xmlns:a16="http://schemas.microsoft.com/office/drawing/2014/main" id="{1559888C-67BD-4EE6-9F92-99E89426E2BF}"/>
+              </a:ext>
+            </a:extLst>
+          </p:cNvPr>
+          <p:cNvCxnSpPr>
+            <a:cxnSpLocks/>
+            <a:stCxn id="37" idx="3"/>
+            <a:endCxn id="67" idx="1"/>
+          </p:cNvCxnSpPr>
+          <p:nvPr/>
+        </p:nvCxnSpPr>
+        <p:spPr>
+          <a:xfrm flipV="1">
+            <a:off x="8704228" y="3038266"/>
+            <a:ext cx="795750" cy="1"/>
+          </a:xfrm>
+          <a:prstGeom prst="straightConnector1">
+            <a:avLst/>
+          </a:prstGeom>
+          <a:ln w="28575">
+            <a:solidFill>
+              <a:schemeClr val="tx1"/>
+            </a:solidFill>
+            <a:prstDash val="sysDash"/>
+            <a:tailEnd type="triangle"/>
+          </a:ln>
+        </p:spPr>
+        <p:style>
+          <a:lnRef idx="1">
+            <a:schemeClr val="accent1"/>
+          </a:lnRef>
+          <a:fillRef idx="0">
+            <a:schemeClr val="accent1"/>
+          </a:fillRef>
+          <a:effectRef idx="0">
+            <a:schemeClr val="accent1"/>
+          </a:effectRef>
+          <a:fontRef idx="minor">
+            <a:schemeClr val="tx1"/>
+          </a:fontRef>
+        </p:style>
+      </p:cxnSp>
+      <p:cxnSp>
+        <p:nvCxnSpPr>
+          <p:cNvPr id="118" name="Connector: Elbow 117">
+            <a:extLst>
+              <a:ext uri="{FF2B5EF4-FFF2-40B4-BE49-F238E27FC236}">
+                <a16:creationId xmlns:a16="http://schemas.microsoft.com/office/drawing/2014/main" id="{9384C421-67A3-4591-875F-25A2CFDE153B}"/>
+              </a:ext>
+            </a:extLst>
+          </p:cNvPr>
+          <p:cNvCxnSpPr>
+            <a:cxnSpLocks/>
+            <a:endCxn id="112" idx="0"/>
+          </p:cNvCxnSpPr>
+          <p:nvPr/>
+        </p:nvCxnSpPr>
+        <p:spPr>
+          <a:xfrm>
+            <a:off x="7201165" y="4264072"/>
+            <a:ext cx="1315280" cy="217336"/>
+          </a:xfrm>
+          <a:prstGeom prst="bentConnector2">
+            <a:avLst/>
+          </a:prstGeom>
+          <a:ln w="28575">
+            <a:solidFill>
+              <a:schemeClr val="tx1"/>
+            </a:solidFill>
+            <a:prstDash val="sysDash"/>
+            <a:tailEnd type="triangle"/>
+          </a:ln>
+        </p:spPr>
+        <p:style>
+          <a:lnRef idx="1">
+            <a:schemeClr val="accent1"/>
+          </a:lnRef>
+          <a:fillRef idx="0">
+            <a:schemeClr val="accent1"/>
+          </a:fillRef>
+          <a:effectRef idx="0">
+            <a:schemeClr val="accent1"/>
+          </a:effectRef>
+          <a:fontRef idx="minor">
+            <a:schemeClr val="tx1"/>
+          </a:fontRef>
+        </p:style>
+      </p:cxnSp>
+      <p:cxnSp>
+        <p:nvCxnSpPr>
+          <p:cNvPr id="119" name="Connector: Elbow 118">
+            <a:extLst>
+              <a:ext uri="{FF2B5EF4-FFF2-40B4-BE49-F238E27FC236}">
+                <a16:creationId xmlns:a16="http://schemas.microsoft.com/office/drawing/2014/main" id="{A3C80A35-B457-4BF0-B8FD-78B6DAEAACBB}"/>
+              </a:ext>
+            </a:extLst>
+          </p:cNvPr>
+          <p:cNvCxnSpPr>
+            <a:cxnSpLocks/>
+            <a:endCxn id="115" idx="0"/>
+          </p:cNvCxnSpPr>
+          <p:nvPr/>
+        </p:nvCxnSpPr>
+        <p:spPr>
+          <a:xfrm rot="10800000" flipV="1">
+            <a:off x="5934093" y="4264071"/>
+            <a:ext cx="1267081" cy="217336"/>
+          </a:xfrm>
+          <a:prstGeom prst="bentConnector2">
+            <a:avLst/>
+          </a:prstGeom>
+          <a:ln w="28575">
+            <a:solidFill>
+              <a:schemeClr val="tx1"/>
+            </a:solidFill>
+            <a:prstDash val="sysDash"/>
+            <a:tailEnd type="triangle"/>
+          </a:ln>
+        </p:spPr>
+        <p:style>
+          <a:lnRef idx="1">
+            <a:schemeClr val="accent1"/>
+          </a:lnRef>
+          <a:fillRef idx="0">
+            <a:schemeClr val="accent1"/>
+          </a:fillRef>
+          <a:effectRef idx="0">
+            <a:schemeClr val="accent1"/>
+          </a:effectRef>
+          <a:fontRef idx="minor">
+            <a:schemeClr val="tx1"/>
+          </a:fontRef>
+        </p:style>
+      </p:cxnSp>
+      <p:grpSp>
+        <p:nvGrpSpPr>
+          <p:cNvPr id="103" name="Group 102">
+            <a:extLst>
+              <a:ext uri="{FF2B5EF4-FFF2-40B4-BE49-F238E27FC236}">
+                <a16:creationId xmlns:a16="http://schemas.microsoft.com/office/drawing/2014/main" id="{13262148-766A-41CE-A473-9A649EF5897B}"/>
+              </a:ext>
+            </a:extLst>
+          </p:cNvPr>
+          <p:cNvGrpSpPr/>
+          <p:nvPr/>
+        </p:nvGrpSpPr>
+        <p:grpSpPr>
+          <a:xfrm>
+            <a:off x="4706415" y="4481407"/>
+            <a:ext cx="2494750" cy="1758923"/>
+            <a:chOff x="4632359" y="8690050"/>
+            <a:chExt cx="2494750" cy="1758923"/>
+          </a:xfrm>
+        </p:grpSpPr>
+        <p:sp>
+          <p:nvSpPr>
+            <p:cNvPr id="115" name="Rectangle 114">
+              <a:extLst>
+                <a:ext uri="{FF2B5EF4-FFF2-40B4-BE49-F238E27FC236}">
+                  <a16:creationId xmlns:a16="http://schemas.microsoft.com/office/drawing/2014/main" id="{F07B2C36-6850-40B4-955B-E642B048946D}"/>
+                </a:ext>
+              </a:extLst>
+            </p:cNvPr>
+            <p:cNvSpPr/>
+            <p:nvPr/>
+          </p:nvSpPr>
+          <p:spPr>
+            <a:xfrm>
+              <a:off x="4632359" y="8690050"/>
+              <a:ext cx="2455353" cy="1758923"/>
+            </a:xfrm>
+            <a:prstGeom prst="rect">
+              <a:avLst/>
+            </a:prstGeom>
+            <a:solidFill>
+              <a:schemeClr val="bg1">
+                <a:lumMod val="95000"/>
+              </a:schemeClr>
+            </a:solidFill>
+            <a:ln w="38100">
+              <a:solidFill>
+                <a:schemeClr val="bg1">
+                  <a:lumMod val="75000"/>
+                </a:schemeClr>
+              </a:solidFill>
+            </a:ln>
+          </p:spPr>
+          <p:style>
+            <a:lnRef idx="2">
+              <a:schemeClr val="accent1">
+                <a:shade val="50000"/>
+              </a:schemeClr>
+            </a:lnRef>
+            <a:fillRef idx="1">
+              <a:schemeClr val="accent1"/>
+            </a:fillRef>
+            <a:effectRef idx="0">
+              <a:schemeClr val="accent1"/>
+            </a:effectRef>
+            <a:fontRef idx="minor">
+              <a:schemeClr val="lt1"/>
+            </a:fontRef>
+          </p:style>
+          <p:txBody>
+            <a:bodyPr lIns="72000" tIns="0" rIns="0" bIns="0" rtlCol="0" anchor="t" anchorCtr="0"/>
+            <a:lstStyle/>
+            <a:p>
+              <a:r>
+                <a:rPr lang="en-GB" dirty="0">
+                  <a:solidFill>
+                    <a:schemeClr val="tx1"/>
+                  </a:solidFill>
+                </a:rPr>
+                <a:t>Generate key</a:t>
+              </a:r>
+            </a:p>
+            <a:p>
+              <a:r>
+                <a:rPr lang="en-GB" dirty="0">
+                  <a:solidFill>
+                    <a:schemeClr val="tx1"/>
+                  </a:solidFill>
+                </a:rPr>
+                <a:t>statistics, plots, </a:t>
+              </a:r>
+            </a:p>
+            <a:p>
+              <a:r>
+                <a:rPr lang="en-GB" dirty="0">
+                  <a:solidFill>
+                    <a:schemeClr val="tx1"/>
+                  </a:solidFill>
+                </a:rPr>
+                <a:t>and monthly</a:t>
+              </a:r>
+            </a:p>
+            <a:p>
+              <a:r>
+                <a:rPr lang="en-GB" dirty="0">
+                  <a:solidFill>
+                    <a:schemeClr val="tx1"/>
+                  </a:solidFill>
+                </a:rPr>
+                <a:t>report</a:t>
+              </a:r>
+            </a:p>
+          </p:txBody>
+        </p:sp>
+        <p:pic>
+          <p:nvPicPr>
+            <p:cNvPr id="117" name="Picture 8" descr="Microsoft Word logo and symbol, meaning, history, PNG">
+              <a:extLst>
+                <a:ext uri="{FF2B5EF4-FFF2-40B4-BE49-F238E27FC236}">
+                  <a16:creationId xmlns:a16="http://schemas.microsoft.com/office/drawing/2014/main" id="{393CFE93-7358-4657-A9BC-8C7FD14296D5}"/>
+                </a:ext>
+              </a:extLst>
+            </p:cNvPr>
+            <p:cNvPicPr>
+              <a:picLocks noChangeAspect="1" noChangeArrowheads="1"/>
+            </p:cNvPicPr>
+            <p:nvPr/>
+          </p:nvPicPr>
+          <p:blipFill rotWithShape="1">
+            <a:blip r:embed="rId7">
+              <a:extLst>
+                <a:ext uri="{28A0092B-C50C-407E-A947-70E740481C1C}">
+                  <a14:useLocalDpi xmlns:a14="http://schemas.microsoft.com/office/drawing/2010/main" val="0"/>
+                </a:ext>
+              </a:extLst>
+            </a:blip>
+            <a:srcRect l="13020" r="13862"/>
+            <a:stretch/>
+          </p:blipFill>
+          <p:spPr bwMode="auto">
+            <a:xfrm>
+              <a:off x="6159343" y="9574193"/>
+              <a:ext cx="967766" cy="827226"/>
+            </a:xfrm>
+            <a:prstGeom prst="rect">
+              <a:avLst/>
+            </a:prstGeom>
+            <a:noFill/>
+            <a:extLst>
+              <a:ext uri="{909E8E84-426E-40DD-AFC4-6F175D3DCCD1}">
+                <a14:hiddenFill xmlns:a14="http://schemas.microsoft.com/office/drawing/2010/main">
+                  <a:solidFill>
+                    <a:srgbClr val="FFFFFF"/>
+                  </a:solidFill>
+                </a14:hiddenFill>
+              </a:ext>
+            </a:extLst>
+          </p:spPr>
+        </p:pic>
+        <p:pic>
+          <p:nvPicPr>
+            <p:cNvPr id="120" name="Picture 4" descr="Hello, R Markdown!">
+              <a:extLst>
+                <a:ext uri="{FF2B5EF4-FFF2-40B4-BE49-F238E27FC236}">
+                  <a16:creationId xmlns:a16="http://schemas.microsoft.com/office/drawing/2014/main" id="{82FA6D05-3B3E-46A4-82FC-D602A20D992C}"/>
+                </a:ext>
+              </a:extLst>
+            </p:cNvPr>
+            <p:cNvPicPr>
+              <a:picLocks noChangeAspect="1" noChangeArrowheads="1"/>
+            </p:cNvPicPr>
+            <p:nvPr/>
+          </p:nvPicPr>
+          <p:blipFill>
+            <a:blip r:embed="rId8">
+              <a:extLst>
+                <a:ext uri="{28A0092B-C50C-407E-A947-70E740481C1C}">
+                  <a14:useLocalDpi xmlns:a14="http://schemas.microsoft.com/office/drawing/2010/main" val="0"/>
+                </a:ext>
+              </a:extLst>
+            </a:blip>
+            <a:srcRect/>
+            <a:stretch>
+              <a:fillRect/>
+            </a:stretch>
+          </p:blipFill>
+          <p:spPr bwMode="auto">
+            <a:xfrm>
+              <a:off x="6337563" y="8739269"/>
+              <a:ext cx="715664" cy="829532"/>
+            </a:xfrm>
+            <a:prstGeom prst="rect">
+              <a:avLst/>
+            </a:prstGeom>
+            <a:noFill/>
+            <a:extLst>
+              <a:ext uri="{909E8E84-426E-40DD-AFC4-6F175D3DCCD1}">
+                <a14:hiddenFill xmlns:a14="http://schemas.microsoft.com/office/drawing/2010/main">
+                  <a:solidFill>
+                    <a:srgbClr val="FFFFFF"/>
+                  </a:solidFill>
+                </a14:hiddenFill>
+              </a:ext>
+            </a:extLst>
+          </p:spPr>
+        </p:pic>
+      </p:grpSp>
+      <p:grpSp>
+        <p:nvGrpSpPr>
+          <p:cNvPr id="102" name="Group 101">
+            <a:extLst>
+              <a:ext uri="{FF2B5EF4-FFF2-40B4-BE49-F238E27FC236}">
+                <a16:creationId xmlns:a16="http://schemas.microsoft.com/office/drawing/2014/main" id="{8C4D394D-04C5-4C05-9B20-45395EE88467}"/>
+              </a:ext>
+            </a:extLst>
+          </p:cNvPr>
+          <p:cNvGrpSpPr/>
+          <p:nvPr/>
+        </p:nvGrpSpPr>
+        <p:grpSpPr>
+          <a:xfrm>
+            <a:off x="7288768" y="4481408"/>
+            <a:ext cx="2455353" cy="1609256"/>
+            <a:chOff x="7214712" y="8690051"/>
+            <a:chExt cx="2455353" cy="1609256"/>
           </a:xfrm>
         </p:grpSpPr>
         <p:grpSp>
           <p:nvGrpSpPr>
-            <p:cNvPr id="57" name="Group 56">
+            <p:cNvPr id="111" name="Group 110">
               <a:extLst>
                 <a:ext uri="{FF2B5EF4-FFF2-40B4-BE49-F238E27FC236}">
-                  <a16:creationId xmlns:a16="http://schemas.microsoft.com/office/drawing/2014/main" id="{7902EEC3-B768-4D48-9782-3043E4D4C487}"/>
+                  <a16:creationId xmlns:a16="http://schemas.microsoft.com/office/drawing/2014/main" id="{F69F82D5-9337-4698-9129-1784F722D539}"/>
                 </a:ext>
               </a:extLst>
             </p:cNvPr>
@@ -6974,18 +8370,23 @@
           </p:nvGrpSpPr>
           <p:grpSpPr>
             <a:xfrm>
-              <a:off x="635313" y="5113612"/>
-              <a:ext cx="1912783" cy="942020"/>
-              <a:chOff x="1003025" y="4479418"/>
-              <a:chExt cx="1912783" cy="942020"/>
+              <a:off x="7214712" y="8690051"/>
+              <a:ext cx="2455353" cy="1609256"/>
+              <a:chOff x="6315421" y="2132873"/>
+              <a:chExt cx="2455353" cy="1609256"/>
             </a:xfrm>
+            <a:solidFill>
+              <a:schemeClr val="bg1">
+                <a:lumMod val="95000"/>
+              </a:schemeClr>
+            </a:solidFill>
           </p:grpSpPr>
           <p:sp>
             <p:nvSpPr>
-              <p:cNvPr id="58" name="Rectangle 57">
+              <p:cNvPr id="112" name="Rectangle 111">
                 <a:extLst>
                   <a:ext uri="{FF2B5EF4-FFF2-40B4-BE49-F238E27FC236}">
-                    <a16:creationId xmlns:a16="http://schemas.microsoft.com/office/drawing/2014/main" id="{F6F7CB1A-54D5-496E-AC16-557FE9C68636}"/>
+                    <a16:creationId xmlns:a16="http://schemas.microsoft.com/office/drawing/2014/main" id="{C3496FBB-3FA5-4BC5-B62D-2688A37B7D89}"/>
                   </a:ext>
                 </a:extLst>
               </p:cNvPr>
@@ -6994,17 +8395,13 @@
             </p:nvSpPr>
             <p:spPr>
               <a:xfrm>
-                <a:off x="1003025" y="4479418"/>
-                <a:ext cx="1912783" cy="942020"/>
+                <a:off x="6315421" y="2132873"/>
+                <a:ext cx="2455353" cy="1609256"/>
               </a:xfrm>
               <a:prstGeom prst="rect">
                 <a:avLst/>
               </a:prstGeom>
-              <a:solidFill>
-                <a:schemeClr val="bg1">
-                  <a:lumMod val="95000"/>
-                </a:schemeClr>
-              </a:solidFill>
+              <a:grpFill/>
               <a:ln w="38100">
                 <a:solidFill>
                   <a:schemeClr val="bg1">
@@ -7039,7 +8436,7 @@
                       <a:schemeClr val="tx1"/>
                     </a:solidFill>
                   </a:rPr>
-                  <a:t>Interactive</a:t>
+                  <a:t>Generate 14</a:t>
                 </a:r>
               </a:p>
               <a:p>
@@ -7049,17 +8446,27 @@
                       <a:schemeClr val="tx1"/>
                     </a:solidFill>
                   </a:rPr>
-                  <a:t>dashboard</a:t>
+                  <a:t>summary tables</a:t>
+                </a:r>
+              </a:p>
+              <a:p>
+                <a:r>
+                  <a:rPr lang="en-GB" dirty="0">
+                    <a:solidFill>
+                      <a:schemeClr val="tx1"/>
+                    </a:solidFill>
+                  </a:rPr>
+                  <a:t>of key statistics</a:t>
                 </a:r>
               </a:p>
             </p:txBody>
           </p:sp>
           <p:pic>
             <p:nvPicPr>
-              <p:cNvPr id="59" name="Picture 8" descr="R for Interactivity: An Introduction to Shiny | Rutgers University Libraries">
+              <p:cNvPr id="113" name="Picture 2" descr="Microsoft Excel - Wikipedia">
                 <a:extLst>
                   <a:ext uri="{FF2B5EF4-FFF2-40B4-BE49-F238E27FC236}">
-                    <a16:creationId xmlns:a16="http://schemas.microsoft.com/office/drawing/2014/main" id="{57222108-238B-4458-BF2A-7E17FF440E9E}"/>
+                    <a16:creationId xmlns:a16="http://schemas.microsoft.com/office/drawing/2014/main" id="{C9B8F817-65B8-4796-A3B3-98CF0ECC7D7E}"/>
                   </a:ext>
                 </a:extLst>
               </p:cNvPr>
@@ -7069,7 +8476,19 @@
               <p:nvPr/>
             </p:nvPicPr>
             <p:blipFill>
-              <a:blip r:embed="rId2">
+              <a:blip r:embed="rId4">
+                <a:clrChange>
+                  <a:clrFrom>
+                    <a:srgbClr val="000000">
+                      <a:alpha val="0"/>
+                    </a:srgbClr>
+                  </a:clrFrom>
+                  <a:clrTo>
+                    <a:srgbClr val="000000">
+                      <a:alpha val="0"/>
+                    </a:srgbClr>
+                  </a:clrTo>
+                </a:clrChange>
                 <a:extLst>
                   <a:ext uri="{28A0092B-C50C-407E-A947-70E740481C1C}">
                     <a14:useLocalDpi xmlns:a14="http://schemas.microsoft.com/office/drawing/2010/main" val="0"/>
@@ -7083,96 +8502,132 @@
             </p:blipFill>
             <p:spPr bwMode="auto">
               <a:xfrm>
-                <a:off x="2154660" y="4535343"/>
-                <a:ext cx="715664" cy="830170"/>
+                <a:off x="7921688" y="2918624"/>
+                <a:ext cx="821093" cy="760235"/>
               </a:xfrm>
               <a:prstGeom prst="rect">
                 <a:avLst/>
               </a:prstGeom>
-              <a:noFill/>
-              <a:extLst>
-                <a:ext uri="{909E8E84-426E-40DD-AFC4-6F175D3DCCD1}">
-                  <a14:hiddenFill xmlns:a14="http://schemas.microsoft.com/office/drawing/2010/main">
-                    <a:solidFill>
-                      <a:srgbClr val="FFFFFF"/>
-                    </a:solidFill>
-                  </a14:hiddenFill>
-                </a:ext>
-              </a:extLst>
+              <a:grpFill/>
+              <a:ln>
+                <a:noFill/>
+              </a:ln>
             </p:spPr>
           </p:pic>
         </p:grpSp>
-        <p:sp>
-          <p:nvSpPr>
-            <p:cNvPr id="4" name="Rectangle 3">
+        <p:pic>
+          <p:nvPicPr>
+            <p:cNvPr id="122" name="Graphic 121">
               <a:extLst>
                 <a:ext uri="{FF2B5EF4-FFF2-40B4-BE49-F238E27FC236}">
-                  <a16:creationId xmlns:a16="http://schemas.microsoft.com/office/drawing/2014/main" id="{B0F3923F-B223-41E2-84BE-DEA21F63EB68}"/>
+                  <a16:creationId xmlns:a16="http://schemas.microsoft.com/office/drawing/2014/main" id="{E9D15A07-B463-4C61-9B9F-1F65C53F4F22}"/>
                 </a:ext>
               </a:extLst>
             </p:cNvPr>
-            <p:cNvSpPr/>
+            <p:cNvPicPr>
+              <a:picLocks noChangeAspect="1"/>
+            </p:cNvPicPr>
             <p:nvPr/>
-          </p:nvSpPr>
+          </p:nvPicPr>
+          <p:blipFill>
+            <a:blip r:embed="rId5">
+              <a:extLst>
+                <a:ext uri="{28A0092B-C50C-407E-A947-70E740481C1C}">
+                  <a14:useLocalDpi xmlns:a14="http://schemas.microsoft.com/office/drawing/2010/main" val="0"/>
+                </a:ext>
+                <a:ext uri="{96DAC541-7B7A-43D3-8B79-37D633B846F1}">
+                  <asvg:svgBlip xmlns:asvg="http://schemas.microsoft.com/office/drawing/2016/SVG/main" r:embed="rId6"/>
+                </a:ext>
+              </a:extLst>
+            </a:blip>
+            <a:stretch>
+              <a:fillRect/>
+            </a:stretch>
+          </p:blipFill>
           <p:spPr>
             <a:xfrm>
-              <a:off x="2956404" y="941074"/>
-              <a:ext cx="2011680" cy="648483"/>
+              <a:off x="8755146" y="8747112"/>
+              <a:ext cx="887211" cy="687466"/>
             </a:xfrm>
             <a:prstGeom prst="rect">
               <a:avLst/>
             </a:prstGeom>
+          </p:spPr>
+        </p:pic>
+      </p:grpSp>
+      <p:cxnSp>
+        <p:nvCxnSpPr>
+          <p:cNvPr id="125" name="Straight Arrow Connector 124">
+            <a:extLst>
+              <a:ext uri="{FF2B5EF4-FFF2-40B4-BE49-F238E27FC236}">
+                <a16:creationId xmlns:a16="http://schemas.microsoft.com/office/drawing/2014/main" id="{FFB910D4-539A-4AFE-8B55-20891505030F}"/>
+              </a:ext>
+            </a:extLst>
+          </p:cNvPr>
+          <p:cNvCxnSpPr>
+            <a:cxnSpLocks/>
+            <a:stCxn id="37" idx="2"/>
+          </p:cNvCxnSpPr>
+          <p:nvPr/>
+        </p:nvCxnSpPr>
+        <p:spPr>
+          <a:xfrm>
+            <a:off x="6757699" y="4014202"/>
+            <a:ext cx="0" cy="249869"/>
+          </a:xfrm>
+          <a:prstGeom prst="straightConnector1">
+            <a:avLst/>
+          </a:prstGeom>
+          <a:ln w="28575">
             <a:solidFill>
-              <a:schemeClr val="bg1">
-                <a:lumMod val="95000"/>
-              </a:schemeClr>
+              <a:schemeClr val="tx1"/>
             </a:solidFill>
-            <a:ln w="38100">
-              <a:solidFill>
-                <a:schemeClr val="bg1">
-                  <a:lumMod val="75000"/>
-                </a:schemeClr>
-              </a:solidFill>
-            </a:ln>
-          </p:spPr>
-          <p:style>
-            <a:lnRef idx="2">
-              <a:schemeClr val="accent1">
-                <a:shade val="50000"/>
-              </a:schemeClr>
-            </a:lnRef>
-            <a:fillRef idx="1">
-              <a:schemeClr val="accent1"/>
-            </a:fillRef>
-            <a:effectRef idx="0">
-              <a:schemeClr val="accent1"/>
-            </a:effectRef>
-            <a:fontRef idx="minor">
-              <a:schemeClr val="lt1"/>
-            </a:fontRef>
-          </p:style>
-          <p:txBody>
-            <a:bodyPr lIns="0" tIns="0" rIns="0" bIns="0" rtlCol="0" anchor="ctr" anchorCtr="1"/>
-            <a:lstStyle/>
-            <a:p>
-              <a:pPr algn="ctr"/>
-              <a:r>
-                <a:rPr lang="en-GB" dirty="0">
-                  <a:solidFill>
-                    <a:schemeClr val="tx1"/>
-                  </a:solidFill>
-                </a:rPr>
-                <a:t>Download the data for the latest month</a:t>
-              </a:r>
-            </a:p>
-          </p:txBody>
-        </p:sp>
+            <a:prstDash val="sysDash"/>
+            <a:headEnd type="none" w="med" len="med"/>
+            <a:tailEnd type="none" w="med" len="med"/>
+          </a:ln>
+        </p:spPr>
+        <p:style>
+          <a:lnRef idx="1">
+            <a:schemeClr val="accent1"/>
+          </a:lnRef>
+          <a:fillRef idx="0">
+            <a:schemeClr val="accent1"/>
+          </a:fillRef>
+          <a:effectRef idx="0">
+            <a:schemeClr val="accent1"/>
+          </a:effectRef>
+          <a:fontRef idx="minor">
+            <a:schemeClr val="tx1"/>
+          </a:fontRef>
+        </p:style>
+      </p:cxnSp>
+      <p:grpSp>
+        <p:nvGrpSpPr>
+          <p:cNvPr id="18" name="Group 17">
+            <a:extLst>
+              <a:ext uri="{FF2B5EF4-FFF2-40B4-BE49-F238E27FC236}">
+                <a16:creationId xmlns:a16="http://schemas.microsoft.com/office/drawing/2014/main" id="{14C76C3D-AD51-44C1-B84E-ADF2CC46950D}"/>
+              </a:ext>
+            </a:extLst>
+          </p:cNvPr>
+          <p:cNvGrpSpPr/>
+          <p:nvPr/>
+        </p:nvGrpSpPr>
+        <p:grpSpPr>
+          <a:xfrm>
+            <a:off x="884716" y="2646580"/>
+            <a:ext cx="1418904" cy="1660721"/>
+            <a:chOff x="1269916" y="3231922"/>
+            <a:chExt cx="1418904" cy="1660721"/>
+          </a:xfrm>
+        </p:grpSpPr>
         <p:grpSp>
           <p:nvGrpSpPr>
-            <p:cNvPr id="9" name="Group 8">
+            <p:cNvPr id="35" name="Group 34">
               <a:extLst>
                 <a:ext uri="{FF2B5EF4-FFF2-40B4-BE49-F238E27FC236}">
-                  <a16:creationId xmlns:a16="http://schemas.microsoft.com/office/drawing/2014/main" id="{DE8E1BC6-3281-41C3-8AFD-D16895A2FCA9}"/>
+                  <a16:creationId xmlns:a16="http://schemas.microsoft.com/office/drawing/2014/main" id="{BDE67903-C600-4C08-BCE1-E90B9B688678}"/>
                 </a:ext>
               </a:extLst>
             </p:cNvPr>
@@ -7181,7 +8636,7 @@
           </p:nvGrpSpPr>
           <p:grpSpPr>
             <a:xfrm>
-              <a:off x="882254" y="617671"/>
+              <a:off x="1269916" y="3231922"/>
               <a:ext cx="1418904" cy="1660721"/>
               <a:chOff x="1275768" y="815003"/>
               <a:chExt cx="1418904" cy="1660721"/>
@@ -7189,10 +8644,10 @@
           </p:grpSpPr>
           <p:sp>
             <p:nvSpPr>
-              <p:cNvPr id="5" name="Flowchart: Magnetic Disk 4">
+              <p:cNvPr id="36" name="Flowchart: Magnetic Disk 35">
                 <a:extLst>
                   <a:ext uri="{FF2B5EF4-FFF2-40B4-BE49-F238E27FC236}">
-                    <a16:creationId xmlns:a16="http://schemas.microsoft.com/office/drawing/2014/main" id="{DD4F5DB3-4C2F-4914-B578-22F4281FE642}"/>
+                    <a16:creationId xmlns:a16="http://schemas.microsoft.com/office/drawing/2014/main" id="{27AC7B5B-573E-478E-B56F-24FABE7749B5}"/>
                   </a:ext>
                 </a:extLst>
               </p:cNvPr>
@@ -7246,10 +8701,10 @@
           </p:sp>
           <p:sp>
             <p:nvSpPr>
-              <p:cNvPr id="6" name="Flowchart: Magnetic Disk 5">
+              <p:cNvPr id="38" name="Flowchart: Magnetic Disk 37">
                 <a:extLst>
                   <a:ext uri="{FF2B5EF4-FFF2-40B4-BE49-F238E27FC236}">
-                    <a16:creationId xmlns:a16="http://schemas.microsoft.com/office/drawing/2014/main" id="{D4039E79-D911-4D38-90CC-DAB29C9DBCA1}"/>
+                    <a16:creationId xmlns:a16="http://schemas.microsoft.com/office/drawing/2014/main" id="{6093DB97-C6E2-4823-9BA2-0054A769C1F0}"/>
                   </a:ext>
                 </a:extLst>
               </p:cNvPr>
@@ -7303,10 +8758,10 @@
           </p:sp>
           <p:sp>
             <p:nvSpPr>
-              <p:cNvPr id="7" name="Flowchart: Magnetic Disk 6">
+              <p:cNvPr id="40" name="Flowchart: Magnetic Disk 39">
                 <a:extLst>
                   <a:ext uri="{FF2B5EF4-FFF2-40B4-BE49-F238E27FC236}">
-                    <a16:creationId xmlns:a16="http://schemas.microsoft.com/office/drawing/2014/main" id="{FC6E351F-2DDA-496F-BDF2-BC44F2C7FEB5}"/>
+                    <a16:creationId xmlns:a16="http://schemas.microsoft.com/office/drawing/2014/main" id="{9D549A41-321E-4415-B490-E434ED311A00}"/>
                   </a:ext>
                 </a:extLst>
               </p:cNvPr>
@@ -7360,10 +8815,10 @@
           </p:sp>
           <p:sp>
             <p:nvSpPr>
-              <p:cNvPr id="8" name="Flowchart: Magnetic Disk 7">
+              <p:cNvPr id="41" name="Flowchart: Magnetic Disk 40">
                 <a:extLst>
                   <a:ext uri="{FF2B5EF4-FFF2-40B4-BE49-F238E27FC236}">
-                    <a16:creationId xmlns:a16="http://schemas.microsoft.com/office/drawing/2014/main" id="{41F27AE0-BB5F-4DF1-BD08-D72C05532093}"/>
+                    <a16:creationId xmlns:a16="http://schemas.microsoft.com/office/drawing/2014/main" id="{FF49D6AD-984B-459C-854D-29DF389746FE}"/>
                   </a:ext>
                 </a:extLst>
               </p:cNvPr>
@@ -7418,10 +8873,10 @@
         </p:grpSp>
         <p:pic>
           <p:nvPicPr>
-            <p:cNvPr id="1026" name="Picture 2" descr="ASYCUDA Logo">
+            <p:cNvPr id="15" name="Picture 2" descr="Download MySQL Logo in SVG Vector or PNG File Format - Logo.wine">
               <a:extLst>
                 <a:ext uri="{FF2B5EF4-FFF2-40B4-BE49-F238E27FC236}">
-                  <a16:creationId xmlns:a16="http://schemas.microsoft.com/office/drawing/2014/main" id="{0A081277-6310-4F6A-851D-A84DB4EC8C75}"/>
+                  <a16:creationId xmlns:a16="http://schemas.microsoft.com/office/drawing/2014/main" id="{EB3D5306-3478-40BA-B9C4-EF420051D003}"/>
                 </a:ext>
               </a:extLst>
             </p:cNvPr>
@@ -7430,23 +8885,21 @@
             </p:cNvPicPr>
             <p:nvPr/>
           </p:nvPicPr>
-          <p:blipFill>
-            <a:blip r:embed="rId3">
+          <p:blipFill rotWithShape="1">
+            <a:blip r:embed="rId9">
               <a:extLst>
                 <a:ext uri="{28A0092B-C50C-407E-A947-70E740481C1C}">
                   <a14:useLocalDpi xmlns:a14="http://schemas.microsoft.com/office/drawing/2010/main" val="0"/>
                 </a:ext>
               </a:extLst>
             </a:blip>
-            <a:srcRect/>
-            <a:stretch>
-              <a:fillRect/>
-            </a:stretch>
+            <a:srcRect l="10150" t="18903" r="10355" b="18655"/>
+            <a:stretch/>
           </p:blipFill>
           <p:spPr bwMode="auto">
             <a:xfrm>
-              <a:off x="887421" y="1336297"/>
-              <a:ext cx="1418903" cy="306504"/>
+              <a:off x="1387105" y="3851632"/>
+              <a:ext cx="1184524" cy="620297"/>
             </a:xfrm>
             <a:prstGeom prst="rect">
               <a:avLst/>
@@ -7463,255 +8916,177 @@
             </a:extLst>
           </p:spPr>
         </p:pic>
-        <p:cxnSp>
-          <p:nvCxnSpPr>
-            <p:cNvPr id="12" name="Straight Connector 11">
+      </p:grpSp>
+      <p:cxnSp>
+        <p:nvCxnSpPr>
+          <p:cNvPr id="45" name="Straight Arrow Connector 44">
+            <a:extLst>
+              <a:ext uri="{FF2B5EF4-FFF2-40B4-BE49-F238E27FC236}">
+                <a16:creationId xmlns:a16="http://schemas.microsoft.com/office/drawing/2014/main" id="{4F1450DC-6B82-4A30-9C67-970C6513797E}"/>
+              </a:ext>
+            </a:extLst>
+          </p:cNvPr>
+          <p:cNvCxnSpPr>
+            <a:cxnSpLocks/>
+            <a:stCxn id="5" idx="3"/>
+            <a:endCxn id="41" idx="1"/>
+          </p:cNvCxnSpPr>
+          <p:nvPr/>
+        </p:nvCxnSpPr>
+        <p:spPr>
+          <a:xfrm>
+            <a:off x="1591707" y="2278392"/>
+            <a:ext cx="2460" cy="368188"/>
+          </a:xfrm>
+          <a:prstGeom prst="straightConnector1">
+            <a:avLst/>
+          </a:prstGeom>
+          <a:ln w="28575">
+            <a:solidFill>
+              <a:schemeClr val="bg1">
+                <a:lumMod val="75000"/>
+              </a:schemeClr>
+            </a:solidFill>
+            <a:prstDash val="sysDash"/>
+            <a:tailEnd type="triangle"/>
+          </a:ln>
+        </p:spPr>
+        <p:style>
+          <a:lnRef idx="1">
+            <a:schemeClr val="accent1"/>
+          </a:lnRef>
+          <a:fillRef idx="0">
+            <a:schemeClr val="accent1"/>
+          </a:fillRef>
+          <a:effectRef idx="0">
+            <a:schemeClr val="accent1"/>
+          </a:effectRef>
+          <a:fontRef idx="minor">
+            <a:schemeClr val="tx1"/>
+          </a:fontRef>
+        </p:style>
+      </p:cxnSp>
+      <p:cxnSp>
+        <p:nvCxnSpPr>
+          <p:cNvPr id="49" name="Straight Arrow Connector 48">
+            <a:extLst>
+              <a:ext uri="{FF2B5EF4-FFF2-40B4-BE49-F238E27FC236}">
+                <a16:creationId xmlns:a16="http://schemas.microsoft.com/office/drawing/2014/main" id="{6BCB1198-D1AF-46FE-AEB0-928CD1CB9EEA}"/>
+              </a:ext>
+            </a:extLst>
+          </p:cNvPr>
+          <p:cNvCxnSpPr>
+            <a:cxnSpLocks/>
+            <a:stCxn id="36" idx="3"/>
+            <a:endCxn id="58" idx="0"/>
+          </p:cNvCxnSpPr>
+          <p:nvPr/>
+        </p:nvCxnSpPr>
+        <p:spPr>
+          <a:xfrm flipH="1">
+            <a:off x="1591705" y="4307301"/>
+            <a:ext cx="2464" cy="806311"/>
+          </a:xfrm>
+          <a:prstGeom prst="straightConnector1">
+            <a:avLst/>
+          </a:prstGeom>
+          <a:ln w="28575">
+            <a:solidFill>
+              <a:schemeClr val="tx1"/>
+            </a:solidFill>
+            <a:prstDash val="sysDash"/>
+            <a:tailEnd type="triangle"/>
+          </a:ln>
+        </p:spPr>
+        <p:style>
+          <a:lnRef idx="1">
+            <a:schemeClr val="accent1"/>
+          </a:lnRef>
+          <a:fillRef idx="0">
+            <a:schemeClr val="accent1"/>
+          </a:fillRef>
+          <a:effectRef idx="0">
+            <a:schemeClr val="accent1"/>
+          </a:effectRef>
+          <a:fontRef idx="minor">
+            <a:schemeClr val="tx1"/>
+          </a:fontRef>
+        </p:style>
+      </p:cxnSp>
+      <p:cxnSp>
+        <p:nvCxnSpPr>
+          <p:cNvPr id="25" name="Connector: Elbow 24">
+            <a:extLst>
+              <a:ext uri="{FF2B5EF4-FFF2-40B4-BE49-F238E27FC236}">
+                <a16:creationId xmlns:a16="http://schemas.microsoft.com/office/drawing/2014/main" id="{F2F948D1-B807-45C7-A768-CCB41895D6EE}"/>
+              </a:ext>
+            </a:extLst>
+          </p:cNvPr>
+          <p:cNvCxnSpPr>
+            <a:cxnSpLocks/>
+            <a:endCxn id="32" idx="2"/>
+          </p:cNvCxnSpPr>
+          <p:nvPr/>
+        </p:nvCxnSpPr>
+        <p:spPr>
+          <a:xfrm rot="16200000" flipV="1">
+            <a:off x="3325922" y="4001272"/>
+            <a:ext cx="612056" cy="1"/>
+          </a:xfrm>
+          <a:prstGeom prst="bentConnector3">
+            <a:avLst>
+              <a:gd name="adj1" fmla="val 50000"/>
+            </a:avLst>
+          </a:prstGeom>
+          <a:ln w="28575">
+            <a:solidFill>
+              <a:schemeClr val="tx1"/>
+            </a:solidFill>
+            <a:prstDash val="sysDash"/>
+            <a:tailEnd type="triangle"/>
+          </a:ln>
+        </p:spPr>
+        <p:style>
+          <a:lnRef idx="1">
+            <a:schemeClr val="accent1"/>
+          </a:lnRef>
+          <a:fillRef idx="0">
+            <a:schemeClr val="accent1"/>
+          </a:fillRef>
+          <a:effectRef idx="0">
+            <a:schemeClr val="accent1"/>
+          </a:effectRef>
+          <a:fontRef idx="minor">
+            <a:schemeClr val="tx1"/>
+          </a:fontRef>
+        </p:style>
+      </p:cxnSp>
+      <p:grpSp>
+        <p:nvGrpSpPr>
+          <p:cNvPr id="43" name="Group 42">
+            <a:extLst>
+              <a:ext uri="{FF2B5EF4-FFF2-40B4-BE49-F238E27FC236}">
+                <a16:creationId xmlns:a16="http://schemas.microsoft.com/office/drawing/2014/main" id="{67FE742F-E6BA-4F81-9AE1-19C9A53DEF23}"/>
+              </a:ext>
+            </a:extLst>
+          </p:cNvPr>
+          <p:cNvGrpSpPr/>
+          <p:nvPr/>
+        </p:nvGrpSpPr>
+        <p:grpSpPr>
+          <a:xfrm>
+            <a:off x="2675557" y="2881169"/>
+            <a:ext cx="1912783" cy="814076"/>
+            <a:chOff x="3094009" y="3476036"/>
+            <a:chExt cx="1912783" cy="814076"/>
+          </a:xfrm>
+        </p:grpSpPr>
+        <p:sp>
+          <p:nvSpPr>
+            <p:cNvPr id="32" name="Rectangle 31">
               <a:extLst>
                 <a:ext uri="{FF2B5EF4-FFF2-40B4-BE49-F238E27FC236}">
-                  <a16:creationId xmlns:a16="http://schemas.microsoft.com/office/drawing/2014/main" id="{745EFF79-6834-4AB1-8F89-629C878B86B1}"/>
-                </a:ext>
-              </a:extLst>
-            </p:cNvPr>
-            <p:cNvCxnSpPr>
-              <a:cxnSpLocks/>
-              <a:stCxn id="4" idx="1"/>
-              <a:endCxn id="7" idx="4"/>
-            </p:cNvCxnSpPr>
-            <p:nvPr/>
-          </p:nvCxnSpPr>
-          <p:spPr>
-            <a:xfrm flipH="1">
-              <a:off x="2301157" y="1265316"/>
-              <a:ext cx="655247" cy="0"/>
-            </a:xfrm>
-            <a:prstGeom prst="line">
-              <a:avLst/>
-            </a:prstGeom>
-            <a:ln w="28575">
-              <a:solidFill>
-                <a:schemeClr val="tx1"/>
-              </a:solidFill>
-              <a:prstDash val="sysDash"/>
-              <a:headEnd type="triangle" w="med" len="med"/>
-              <a:tailEnd type="none" w="med" len="med"/>
-            </a:ln>
-          </p:spPr>
-          <p:style>
-            <a:lnRef idx="1">
-              <a:schemeClr val="accent1"/>
-            </a:lnRef>
-            <a:fillRef idx="0">
-              <a:schemeClr val="accent1"/>
-            </a:fillRef>
-            <a:effectRef idx="0">
-              <a:schemeClr val="accent1"/>
-            </a:effectRef>
-            <a:fontRef idx="minor">
-              <a:schemeClr val="tx1"/>
-            </a:fontRef>
-          </p:style>
-        </p:cxnSp>
-        <p:grpSp>
-          <p:nvGrpSpPr>
-            <p:cNvPr id="29" name="Group 28">
-              <a:extLst>
-                <a:ext uri="{FF2B5EF4-FFF2-40B4-BE49-F238E27FC236}">
-                  <a16:creationId xmlns:a16="http://schemas.microsoft.com/office/drawing/2014/main" id="{0D711C5E-8138-43A0-AEE5-F5B20729EE84}"/>
-                </a:ext>
-              </a:extLst>
-            </p:cNvPr>
-            <p:cNvGrpSpPr/>
-            <p:nvPr/>
-          </p:nvGrpSpPr>
-          <p:grpSpPr>
-            <a:xfrm>
-              <a:off x="5530023" y="857515"/>
-              <a:ext cx="2455353" cy="815600"/>
-              <a:chOff x="6315421" y="2132873"/>
-              <a:chExt cx="2455353" cy="815600"/>
-            </a:xfrm>
-            <a:solidFill>
-              <a:schemeClr val="bg1">
-                <a:lumMod val="95000"/>
-              </a:schemeClr>
-            </a:solidFill>
-          </p:grpSpPr>
-          <p:sp>
-            <p:nvSpPr>
-              <p:cNvPr id="31" name="Rectangle 30">
-                <a:extLst>
-                  <a:ext uri="{FF2B5EF4-FFF2-40B4-BE49-F238E27FC236}">
-                    <a16:creationId xmlns:a16="http://schemas.microsoft.com/office/drawing/2014/main" id="{C3405F75-90B3-46FD-A5AD-840C6FE663C6}"/>
-                  </a:ext>
-                </a:extLst>
-              </p:cNvPr>
-              <p:cNvSpPr/>
-              <p:nvPr/>
-            </p:nvSpPr>
-            <p:spPr>
-              <a:xfrm>
-                <a:off x="6315421" y="2132873"/>
-                <a:ext cx="2455353" cy="815600"/>
-              </a:xfrm>
-              <a:prstGeom prst="rect">
-                <a:avLst/>
-              </a:prstGeom>
-              <a:grpFill/>
-              <a:ln w="38100">
-                <a:solidFill>
-                  <a:schemeClr val="bg1">
-                    <a:lumMod val="75000"/>
-                  </a:schemeClr>
-                </a:solidFill>
-              </a:ln>
-            </p:spPr>
-            <p:style>
-              <a:lnRef idx="2">
-                <a:schemeClr val="accent1">
-                  <a:shade val="50000"/>
-                </a:schemeClr>
-              </a:lnRef>
-              <a:fillRef idx="1">
-                <a:schemeClr val="accent1"/>
-              </a:fillRef>
-              <a:effectRef idx="0">
-                <a:schemeClr val="accent1"/>
-              </a:effectRef>
-              <a:fontRef idx="minor">
-                <a:schemeClr val="lt1"/>
-              </a:fontRef>
-            </p:style>
-            <p:txBody>
-              <a:bodyPr lIns="72000" tIns="0" rIns="0" bIns="0" rtlCol="0" anchor="t" anchorCtr="0"/>
-              <a:lstStyle/>
-              <a:p>
-                <a:r>
-                  <a:rPr lang="en-GB" dirty="0">
-                    <a:solidFill>
-                      <a:schemeClr val="tx1"/>
-                    </a:solidFill>
-                  </a:rPr>
-                  <a:t>Save the data as </a:t>
-                </a:r>
-              </a:p>
-              <a:p>
-                <a:r>
-                  <a:rPr lang="en-GB" dirty="0">
-                    <a:solidFill>
-                      <a:schemeClr val="tx1"/>
-                    </a:solidFill>
-                  </a:rPr>
-                  <a:t>an excel file</a:t>
-                </a:r>
-              </a:p>
-            </p:txBody>
-          </p:sp>
-          <p:pic>
-            <p:nvPicPr>
-              <p:cNvPr id="28" name="Picture 2" descr="Microsoft Excel - Wikipedia">
-                <a:extLst>
-                  <a:ext uri="{FF2B5EF4-FFF2-40B4-BE49-F238E27FC236}">
-                    <a16:creationId xmlns:a16="http://schemas.microsoft.com/office/drawing/2014/main" id="{FDA76825-181D-4EC8-B6A4-42845D5D93CD}"/>
-                  </a:ext>
-                </a:extLst>
-              </p:cNvPr>
-              <p:cNvPicPr>
-                <a:picLocks noChangeAspect="1" noChangeArrowheads="1"/>
-              </p:cNvPicPr>
-              <p:nvPr/>
-            </p:nvPicPr>
-            <p:blipFill>
-              <a:blip r:embed="rId4">
-                <a:clrChange>
-                  <a:clrFrom>
-                    <a:srgbClr val="000000">
-                      <a:alpha val="0"/>
-                    </a:srgbClr>
-                  </a:clrFrom>
-                  <a:clrTo>
-                    <a:srgbClr val="000000">
-                      <a:alpha val="0"/>
-                    </a:srgbClr>
-                  </a:clrTo>
-                </a:clrChange>
-                <a:extLst>
-                  <a:ext uri="{28A0092B-C50C-407E-A947-70E740481C1C}">
-                    <a14:useLocalDpi xmlns:a14="http://schemas.microsoft.com/office/drawing/2010/main" val="0"/>
-                  </a:ext>
-                </a:extLst>
-              </a:blip>
-              <a:srcRect/>
-              <a:stretch>
-                <a:fillRect/>
-              </a:stretch>
-            </p:blipFill>
-            <p:spPr bwMode="auto">
-              <a:xfrm>
-                <a:off x="7921688" y="2160864"/>
-                <a:ext cx="821093" cy="760235"/>
-              </a:xfrm>
-              <a:prstGeom prst="rect">
-                <a:avLst/>
-              </a:prstGeom>
-              <a:grpFill/>
-              <a:ln>
-                <a:noFill/>
-              </a:ln>
-            </p:spPr>
-          </p:pic>
-        </p:grpSp>
-        <p:cxnSp>
-          <p:nvCxnSpPr>
-            <p:cNvPr id="34" name="Straight Arrow Connector 33">
-              <a:extLst>
-                <a:ext uri="{FF2B5EF4-FFF2-40B4-BE49-F238E27FC236}">
-                  <a16:creationId xmlns:a16="http://schemas.microsoft.com/office/drawing/2014/main" id="{C56F6CE5-CD7D-4401-B301-E42AE3E552D4}"/>
-                </a:ext>
-              </a:extLst>
-            </p:cNvPr>
-            <p:cNvCxnSpPr>
-              <a:stCxn id="4" idx="3"/>
-              <a:endCxn id="31" idx="1"/>
-            </p:cNvCxnSpPr>
-            <p:nvPr/>
-          </p:nvCxnSpPr>
-          <p:spPr>
-            <a:xfrm flipV="1">
-              <a:off x="4968084" y="1265315"/>
-              <a:ext cx="561939" cy="1"/>
-            </a:xfrm>
-            <a:prstGeom prst="straightConnector1">
-              <a:avLst/>
-            </a:prstGeom>
-            <a:ln w="28575">
-              <a:solidFill>
-                <a:schemeClr val="tx1"/>
-              </a:solidFill>
-              <a:prstDash val="sysDash"/>
-              <a:tailEnd type="triangle"/>
-            </a:ln>
-          </p:spPr>
-          <p:style>
-            <a:lnRef idx="1">
-              <a:schemeClr val="accent1"/>
-            </a:lnRef>
-            <a:fillRef idx="0">
-              <a:schemeClr val="accent1"/>
-            </a:fillRef>
-            <a:effectRef idx="0">
-              <a:schemeClr val="accent1"/>
-            </a:effectRef>
-            <a:fontRef idx="minor">
-              <a:schemeClr val="tx1"/>
-            </a:fontRef>
-          </p:style>
-        </p:cxnSp>
-        <p:sp>
-          <p:nvSpPr>
-            <p:cNvPr id="37" name="Rectangle 36">
-              <a:extLst>
-                <a:ext uri="{FF2B5EF4-FFF2-40B4-BE49-F238E27FC236}">
-                  <a16:creationId xmlns:a16="http://schemas.microsoft.com/office/drawing/2014/main" id="{4B395FCF-570C-48DD-A568-2108FD8FA957}"/>
+                  <a16:creationId xmlns:a16="http://schemas.microsoft.com/office/drawing/2014/main" id="{B3DA708F-CAF2-4CBA-9188-7C2314C4301C}"/>
                 </a:ext>
               </a:extLst>
             </p:cNvPr>
@@ -7720,8 +9095,8 @@
           </p:nvSpPr>
           <p:spPr>
             <a:xfrm>
-              <a:off x="4811170" y="2062331"/>
-              <a:ext cx="3893058" cy="1951871"/>
+              <a:off x="3094009" y="3476036"/>
+              <a:ext cx="1912783" cy="814076"/>
             </a:xfrm>
             <a:prstGeom prst="rect">
               <a:avLst/>
@@ -7765,218 +9140,37 @@
                     <a:schemeClr val="tx1"/>
                   </a:solidFill>
                 </a:rPr>
-                <a:t>Process and clean data:</a:t>
+                <a:t>Update </a:t>
               </a:r>
             </a:p>
             <a:p>
-              <a:pPr marL="285750" indent="-285750">
-                <a:buFont typeface="Arial" panose="020B0604020202020204" pitchFamily="34" charset="0"/>
-                <a:buChar char="•"/>
-              </a:pPr>
               <a:r>
                 <a:rPr lang="en-GB" dirty="0">
                   <a:solidFill>
                     <a:schemeClr val="tx1"/>
                   </a:solidFill>
                 </a:rPr>
-                <a:t>Format date columns</a:t>
+                <a:t>local data</a:t>
               </a:r>
             </a:p>
             <a:p>
-              <a:pPr marL="285750" indent="-285750">
-                <a:buFont typeface="Arial" panose="020B0604020202020204" pitchFamily="34" charset="0"/>
-                <a:buChar char="•"/>
-              </a:pPr>
               <a:r>
                 <a:rPr lang="en-GB" dirty="0">
                   <a:solidFill>
                     <a:schemeClr val="tx1"/>
                   </a:solidFill>
                 </a:rPr>
-                <a:t>Examine missing data</a:t>
-              </a:r>
-            </a:p>
-            <a:p>
-              <a:pPr marL="285750" indent="-285750">
-                <a:buFont typeface="Arial" panose="020B0604020202020204" pitchFamily="34" charset="0"/>
-                <a:buChar char="•"/>
-              </a:pPr>
-              <a:r>
-                <a:rPr lang="en-GB" dirty="0">
-                  <a:solidFill>
-                    <a:schemeClr val="tx1"/>
-                  </a:solidFill>
-                </a:rPr>
-                <a:t>Extract HS and SITC sub-codes</a:t>
-              </a:r>
-            </a:p>
-            <a:p>
-              <a:pPr marL="285750" indent="-285750">
-                <a:buFont typeface="Arial" panose="020B0604020202020204" pitchFamily="34" charset="0"/>
-                <a:buChar char="•"/>
-              </a:pPr>
-              <a:r>
-                <a:rPr lang="en-GB" dirty="0">
-                  <a:solidFill>
-                    <a:schemeClr val="tx1"/>
-                  </a:solidFill>
-                </a:rPr>
-                <a:t>Merge classification tables</a:t>
-              </a:r>
-            </a:p>
-            <a:p>
-              <a:pPr marL="285750" indent="-285750">
-                <a:buFont typeface="Arial" panose="020B0604020202020204" pitchFamily="34" charset="0"/>
-                <a:buChar char="•"/>
-              </a:pPr>
-              <a:r>
-                <a:rPr lang="en-GB" dirty="0">
-                  <a:solidFill>
-                    <a:schemeClr val="tx1"/>
-                  </a:solidFill>
-                </a:rPr>
-                <a:t>Check for missing classification codes</a:t>
-              </a:r>
-            </a:p>
-            <a:p>
-              <a:pPr marL="285750" indent="-285750">
-                <a:buFont typeface="Arial" panose="020B0604020202020204" pitchFamily="34" charset="0"/>
-                <a:buChar char="•"/>
-              </a:pPr>
-              <a:r>
-                <a:rPr lang="en-GB" dirty="0">
-                  <a:solidFill>
-                    <a:schemeClr val="tx1"/>
-                  </a:solidFill>
-                </a:rPr>
-                <a:t>Check for outliers</a:t>
-              </a:r>
-            </a:p>
-            <a:p>
-              <a:endParaRPr lang="en-GB" dirty="0">
-                <a:solidFill>
-                  <a:schemeClr val="tx1"/>
-                </a:solidFill>
-              </a:endParaRPr>
-            </a:p>
-          </p:txBody>
-        </p:sp>
-        <p:cxnSp>
-          <p:nvCxnSpPr>
-            <p:cNvPr id="39" name="Straight Arrow Connector 38">
-              <a:extLst>
-                <a:ext uri="{FF2B5EF4-FFF2-40B4-BE49-F238E27FC236}">
-                  <a16:creationId xmlns:a16="http://schemas.microsoft.com/office/drawing/2014/main" id="{BC117CA7-2521-47A4-8E41-30B9E7FA69F7}"/>
-                </a:ext>
-              </a:extLst>
-            </p:cNvPr>
-            <p:cNvCxnSpPr>
-              <a:cxnSpLocks/>
-              <a:stCxn id="31" idx="2"/>
-              <a:endCxn id="37" idx="0"/>
-            </p:cNvCxnSpPr>
-            <p:nvPr/>
-          </p:nvCxnSpPr>
-          <p:spPr>
-            <a:xfrm flipH="1">
-              <a:off x="6757699" y="1673115"/>
-              <a:ext cx="1" cy="389216"/>
-            </a:xfrm>
-            <a:prstGeom prst="straightConnector1">
-              <a:avLst/>
-            </a:prstGeom>
-            <a:ln w="28575">
-              <a:solidFill>
-                <a:schemeClr val="tx1"/>
-              </a:solidFill>
-              <a:prstDash val="sysDash"/>
-              <a:tailEnd type="triangle"/>
-            </a:ln>
-          </p:spPr>
-          <p:style>
-            <a:lnRef idx="1">
-              <a:schemeClr val="accent1"/>
-            </a:lnRef>
-            <a:fillRef idx="0">
-              <a:schemeClr val="accent1"/>
-            </a:fillRef>
-            <a:effectRef idx="0">
-              <a:schemeClr val="accent1"/>
-            </a:effectRef>
-            <a:fontRef idx="minor">
-              <a:schemeClr val="tx1"/>
-            </a:fontRef>
-          </p:style>
-        </p:cxnSp>
-        <p:sp>
-          <p:nvSpPr>
-            <p:cNvPr id="67" name="Rectangle 66">
-              <a:extLst>
-                <a:ext uri="{FF2B5EF4-FFF2-40B4-BE49-F238E27FC236}">
-                  <a16:creationId xmlns:a16="http://schemas.microsoft.com/office/drawing/2014/main" id="{D940A257-2DBC-4329-A849-483DA0F6E234}"/>
-                </a:ext>
-              </a:extLst>
-            </p:cNvPr>
-            <p:cNvSpPr/>
-            <p:nvPr/>
-          </p:nvSpPr>
-          <p:spPr>
-            <a:xfrm>
-              <a:off x="9499978" y="2714024"/>
-              <a:ext cx="1809768" cy="648483"/>
-            </a:xfrm>
-            <a:prstGeom prst="rect">
-              <a:avLst/>
-            </a:prstGeom>
-            <a:solidFill>
-              <a:schemeClr val="bg1">
-                <a:lumMod val="95000"/>
-              </a:schemeClr>
-            </a:solidFill>
-            <a:ln w="38100">
-              <a:solidFill>
-                <a:srgbClr val="FF0000"/>
-              </a:solidFill>
-            </a:ln>
-          </p:spPr>
-          <p:style>
-            <a:lnRef idx="2">
-              <a:schemeClr val="accent1">
-                <a:shade val="50000"/>
-              </a:schemeClr>
-            </a:lnRef>
-            <a:fillRef idx="1">
-              <a:schemeClr val="accent1"/>
-            </a:fillRef>
-            <a:effectRef idx="0">
-              <a:schemeClr val="accent1"/>
-            </a:effectRef>
-            <a:fontRef idx="minor">
-              <a:schemeClr val="lt1"/>
-            </a:fontRef>
-          </p:style>
-          <p:txBody>
-            <a:bodyPr lIns="0" tIns="0" rIns="0" bIns="0" rtlCol="0" anchor="ctr" anchorCtr="1"/>
-            <a:lstStyle/>
-            <a:p>
-              <a:pPr algn="ctr"/>
-              <a:r>
-                <a:rPr lang="en-GB" dirty="0">
-                  <a:solidFill>
-                    <a:schemeClr val="tx1"/>
-                  </a:solidFill>
-                </a:rPr>
-                <a:t>Flag issues to report to customs</a:t>
+                <a:t> store</a:t>
               </a:r>
             </a:p>
           </p:txBody>
         </p:sp>
         <p:pic>
           <p:nvPicPr>
-            <p:cNvPr id="11" name="Graphic 10">
+            <p:cNvPr id="61" name="Graphic 60">
               <a:extLst>
                 <a:ext uri="{FF2B5EF4-FFF2-40B4-BE49-F238E27FC236}">
-                  <a16:creationId xmlns:a16="http://schemas.microsoft.com/office/drawing/2014/main" id="{23F6F2FD-B085-41FE-9C1F-20F540BEA938}"/>
+                  <a16:creationId xmlns:a16="http://schemas.microsoft.com/office/drawing/2014/main" id="{87742C57-9DBE-4A05-8DC0-AE545B54ECCB}"/>
                 </a:ext>
               </a:extLst>
             </p:cNvPr>
@@ -8002,7 +9196,7 @@
           </p:blipFill>
           <p:spPr>
             <a:xfrm>
-              <a:off x="7780441" y="2115722"/>
+              <a:off x="4101286" y="3556163"/>
               <a:ext cx="887211" cy="687466"/>
             </a:xfrm>
             <a:prstGeom prst="rect">
@@ -8010,1267 +9204,273 @@
             </a:prstGeom>
           </p:spPr>
         </p:pic>
-        <p:cxnSp>
-          <p:nvCxnSpPr>
-            <p:cNvPr id="95" name="Straight Arrow Connector 94">
-              <a:extLst>
-                <a:ext uri="{FF2B5EF4-FFF2-40B4-BE49-F238E27FC236}">
-                  <a16:creationId xmlns:a16="http://schemas.microsoft.com/office/drawing/2014/main" id="{1559888C-67BD-4EE6-9F92-99E89426E2BF}"/>
-                </a:ext>
-              </a:extLst>
-            </p:cNvPr>
-            <p:cNvCxnSpPr>
-              <a:cxnSpLocks/>
-              <a:stCxn id="37" idx="3"/>
-              <a:endCxn id="67" idx="1"/>
-            </p:cNvCxnSpPr>
-            <p:nvPr/>
-          </p:nvCxnSpPr>
-          <p:spPr>
-            <a:xfrm flipV="1">
-              <a:off x="8704228" y="3038266"/>
-              <a:ext cx="795750" cy="1"/>
-            </a:xfrm>
-            <a:prstGeom prst="straightConnector1">
-              <a:avLst/>
-            </a:prstGeom>
-            <a:ln w="28575">
-              <a:solidFill>
-                <a:schemeClr val="tx1"/>
-              </a:solidFill>
-              <a:prstDash val="sysDash"/>
-              <a:tailEnd type="triangle"/>
-            </a:ln>
-          </p:spPr>
-          <p:style>
-            <a:lnRef idx="1">
-              <a:schemeClr val="accent1"/>
-            </a:lnRef>
-            <a:fillRef idx="0">
-              <a:schemeClr val="accent1"/>
-            </a:fillRef>
-            <a:effectRef idx="0">
-              <a:schemeClr val="accent1"/>
-            </a:effectRef>
-            <a:fontRef idx="minor">
+      </p:grpSp>
+      <p:cxnSp>
+        <p:nvCxnSpPr>
+          <p:cNvPr id="63" name="Straight Arrow Connector 62">
+            <a:extLst>
+              <a:ext uri="{FF2B5EF4-FFF2-40B4-BE49-F238E27FC236}">
+                <a16:creationId xmlns:a16="http://schemas.microsoft.com/office/drawing/2014/main" id="{2F2E8625-DE52-4DD5-9F70-F37B69C84310}"/>
+              </a:ext>
+            </a:extLst>
+          </p:cNvPr>
+          <p:cNvCxnSpPr>
+            <a:cxnSpLocks/>
+            <a:stCxn id="32" idx="1"/>
+            <a:endCxn id="40" idx="4"/>
+          </p:cNvCxnSpPr>
+          <p:nvPr/>
+        </p:nvCxnSpPr>
+        <p:spPr>
+          <a:xfrm flipH="1">
+            <a:off x="2303619" y="3288207"/>
+            <a:ext cx="371938" cy="6018"/>
+          </a:xfrm>
+          <a:prstGeom prst="straightConnector1">
+            <a:avLst/>
+          </a:prstGeom>
+          <a:ln w="28575">
+            <a:solidFill>
               <a:schemeClr val="tx1"/>
-            </a:fontRef>
-          </p:style>
-        </p:cxnSp>
-        <p:cxnSp>
-          <p:nvCxnSpPr>
-            <p:cNvPr id="118" name="Connector: Elbow 117">
-              <a:extLst>
-                <a:ext uri="{FF2B5EF4-FFF2-40B4-BE49-F238E27FC236}">
-                  <a16:creationId xmlns:a16="http://schemas.microsoft.com/office/drawing/2014/main" id="{9384C421-67A3-4591-875F-25A2CFDE153B}"/>
-                </a:ext>
-              </a:extLst>
-            </p:cNvPr>
-            <p:cNvCxnSpPr>
-              <a:cxnSpLocks/>
-              <a:endCxn id="112" idx="0"/>
-            </p:cNvCxnSpPr>
-            <p:nvPr/>
-          </p:nvCxnSpPr>
-          <p:spPr>
-            <a:xfrm>
-              <a:off x="6727344" y="4264072"/>
-              <a:ext cx="1315280" cy="217336"/>
-            </a:xfrm>
-            <a:prstGeom prst="bentConnector2">
-              <a:avLst/>
-            </a:prstGeom>
-            <a:ln w="28575">
-              <a:solidFill>
-                <a:schemeClr val="tx1"/>
-              </a:solidFill>
-              <a:prstDash val="sysDash"/>
-              <a:tailEnd type="triangle"/>
-            </a:ln>
-          </p:spPr>
-          <p:style>
-            <a:lnRef idx="1">
-              <a:schemeClr val="accent1"/>
-            </a:lnRef>
-            <a:fillRef idx="0">
-              <a:schemeClr val="accent1"/>
-            </a:fillRef>
-            <a:effectRef idx="0">
-              <a:schemeClr val="accent1"/>
-            </a:effectRef>
-            <a:fontRef idx="minor">
+            </a:solidFill>
+            <a:prstDash val="sysDash"/>
+            <a:tailEnd type="triangle"/>
+          </a:ln>
+        </p:spPr>
+        <p:style>
+          <a:lnRef idx="1">
+            <a:schemeClr val="accent1"/>
+          </a:lnRef>
+          <a:fillRef idx="0">
+            <a:schemeClr val="accent1"/>
+          </a:fillRef>
+          <a:effectRef idx="0">
+            <a:schemeClr val="accent1"/>
+          </a:effectRef>
+          <a:fontRef idx="minor">
+            <a:schemeClr val="tx1"/>
+          </a:fontRef>
+        </p:style>
+      </p:cxnSp>
+      <p:sp>
+        <p:nvSpPr>
+          <p:cNvPr id="50" name="Rectangle 49">
+            <a:extLst>
+              <a:ext uri="{FF2B5EF4-FFF2-40B4-BE49-F238E27FC236}">
+                <a16:creationId xmlns:a16="http://schemas.microsoft.com/office/drawing/2014/main" id="{FD862C67-DF00-4899-A76E-C520BA14AF80}"/>
+              </a:ext>
+            </a:extLst>
+          </p:cNvPr>
+          <p:cNvSpPr/>
+          <p:nvPr/>
+        </p:nvSpPr>
+        <p:spPr>
+          <a:xfrm>
+            <a:off x="2674209" y="5113612"/>
+            <a:ext cx="1912783" cy="942020"/>
+          </a:xfrm>
+          <a:prstGeom prst="rect">
+            <a:avLst/>
+          </a:prstGeom>
+          <a:solidFill>
+            <a:schemeClr val="bg1">
+              <a:lumMod val="95000"/>
+            </a:schemeClr>
+          </a:solidFill>
+          <a:ln w="38100">
+            <a:solidFill>
+              <a:schemeClr val="bg1">
+                <a:lumMod val="75000"/>
+              </a:schemeClr>
+            </a:solidFill>
+          </a:ln>
+        </p:spPr>
+        <p:style>
+          <a:lnRef idx="2">
+            <a:schemeClr val="accent1">
+              <a:shade val="50000"/>
+            </a:schemeClr>
+          </a:lnRef>
+          <a:fillRef idx="1">
+            <a:schemeClr val="accent1"/>
+          </a:fillRef>
+          <a:effectRef idx="0">
+            <a:schemeClr val="accent1"/>
+          </a:effectRef>
+          <a:fontRef idx="minor">
+            <a:schemeClr val="lt1"/>
+          </a:fontRef>
+        </p:style>
+        <p:txBody>
+          <a:bodyPr lIns="72000" tIns="0" rIns="0" bIns="0" rtlCol="0" anchor="t" anchorCtr="0"/>
+          <a:lstStyle/>
+          <a:p>
+            <a:r>
+              <a:rPr lang="en-GB" dirty="0">
+                <a:solidFill>
+                  <a:schemeClr val="tx1"/>
+                </a:solidFill>
+              </a:rPr>
+              <a:t>Public data</a:t>
+            </a:r>
+          </a:p>
+          <a:p>
+            <a:r>
+              <a:rPr lang="en-GB" dirty="0">
+                <a:solidFill>
+                  <a:schemeClr val="tx1"/>
+                </a:solidFill>
+              </a:rPr>
+              <a:t>repository</a:t>
+            </a:r>
+          </a:p>
+        </p:txBody>
+      </p:sp>
+      <p:cxnSp>
+        <p:nvCxnSpPr>
+          <p:cNvPr id="51" name="Connector: Elbow 50">
+            <a:extLst>
+              <a:ext uri="{FF2B5EF4-FFF2-40B4-BE49-F238E27FC236}">
+                <a16:creationId xmlns:a16="http://schemas.microsoft.com/office/drawing/2014/main" id="{9B5D9EDC-9331-47C7-9FB7-7C857D99B68B}"/>
+              </a:ext>
+            </a:extLst>
+          </p:cNvPr>
+          <p:cNvCxnSpPr>
+            <a:cxnSpLocks/>
+          </p:cNvCxnSpPr>
+          <p:nvPr/>
+        </p:nvCxnSpPr>
+        <p:spPr>
+          <a:xfrm rot="10800000" flipV="1">
+            <a:off x="3630601" y="4261149"/>
+            <a:ext cx="2342888" cy="844149"/>
+          </a:xfrm>
+          <a:prstGeom prst="bentConnector2">
+            <a:avLst/>
+          </a:prstGeom>
+          <a:ln w="28575">
+            <a:solidFill>
               <a:schemeClr val="tx1"/>
-            </a:fontRef>
-          </p:style>
-        </p:cxnSp>
-        <p:cxnSp>
-          <p:nvCxnSpPr>
-            <p:cNvPr id="119" name="Connector: Elbow 118">
-              <a:extLst>
-                <a:ext uri="{FF2B5EF4-FFF2-40B4-BE49-F238E27FC236}">
-                  <a16:creationId xmlns:a16="http://schemas.microsoft.com/office/drawing/2014/main" id="{A3C80A35-B457-4BF0-B8FD-78B6DAEAACBB}"/>
-                </a:ext>
-              </a:extLst>
-            </p:cNvPr>
-            <p:cNvCxnSpPr>
-              <a:cxnSpLocks/>
-              <a:endCxn id="115" idx="0"/>
-            </p:cNvCxnSpPr>
-            <p:nvPr/>
-          </p:nvCxnSpPr>
-          <p:spPr>
-            <a:xfrm rot="10800000" flipV="1">
-              <a:off x="5460272" y="4264071"/>
-              <a:ext cx="1267081" cy="217336"/>
-            </a:xfrm>
-            <a:prstGeom prst="bentConnector2">
-              <a:avLst/>
-            </a:prstGeom>
-            <a:ln w="28575">
-              <a:solidFill>
-                <a:schemeClr val="tx1"/>
-              </a:solidFill>
-              <a:prstDash val="sysDash"/>
-              <a:tailEnd type="triangle"/>
-            </a:ln>
-          </p:spPr>
-          <p:style>
-            <a:lnRef idx="1">
-              <a:schemeClr val="accent1"/>
-            </a:lnRef>
-            <a:fillRef idx="0">
-              <a:schemeClr val="accent1"/>
-            </a:fillRef>
-            <a:effectRef idx="0">
-              <a:schemeClr val="accent1"/>
-            </a:effectRef>
-            <a:fontRef idx="minor">
+            </a:solidFill>
+            <a:prstDash val="sysDash"/>
+            <a:tailEnd type="triangle"/>
+          </a:ln>
+        </p:spPr>
+        <p:style>
+          <a:lnRef idx="1">
+            <a:schemeClr val="accent1"/>
+          </a:lnRef>
+          <a:fillRef idx="0">
+            <a:schemeClr val="accent1"/>
+          </a:fillRef>
+          <a:effectRef idx="0">
+            <a:schemeClr val="accent1"/>
+          </a:effectRef>
+          <a:fontRef idx="minor">
+            <a:schemeClr val="tx1"/>
+          </a:fontRef>
+        </p:style>
+      </p:cxnSp>
+      <p:pic>
+        <p:nvPicPr>
+          <p:cNvPr id="14" name="Picture 2" descr="csv files | BlazeMeter">
+            <a:extLst>
+              <a:ext uri="{FF2B5EF4-FFF2-40B4-BE49-F238E27FC236}">
+                <a16:creationId xmlns:a16="http://schemas.microsoft.com/office/drawing/2014/main" id="{469AB037-6CB3-4C9E-A613-46FDB6888CE3}"/>
+              </a:ext>
+            </a:extLst>
+          </p:cNvPr>
+          <p:cNvPicPr>
+            <a:picLocks noChangeAspect="1" noChangeArrowheads="1"/>
+          </p:cNvPicPr>
+          <p:nvPr/>
+        </p:nvPicPr>
+        <p:blipFill rotWithShape="1">
+          <a:blip r:embed="rId10">
+            <a:clrChange>
+              <a:clrFrom>
+                <a:srgbClr val="FFFFFF"/>
+              </a:clrFrom>
+              <a:clrTo>
+                <a:srgbClr val="FFFFFF">
+                  <a:alpha val="0"/>
+                </a:srgbClr>
+              </a:clrTo>
+            </a:clrChange>
+            <a:extLst>
+              <a:ext uri="{28A0092B-C50C-407E-A947-70E740481C1C}">
+                <a14:useLocalDpi xmlns:a14="http://schemas.microsoft.com/office/drawing/2010/main" val="0"/>
+              </a:ext>
+            </a:extLst>
+          </a:blip>
+          <a:srcRect l="24979" t="2715" r="24737" b="2536"/>
+          <a:stretch/>
+        </p:blipFill>
+        <p:spPr bwMode="auto">
+          <a:xfrm>
+            <a:off x="3759980" y="5171008"/>
+            <a:ext cx="798221" cy="827227"/>
+          </a:xfrm>
+          <a:prstGeom prst="rect">
+            <a:avLst/>
+          </a:prstGeom>
+          <a:noFill/>
+          <a:extLst>
+            <a:ext uri="{909E8E84-426E-40DD-AFC4-6F175D3DCCD1}">
+              <a14:hiddenFill xmlns:a14="http://schemas.microsoft.com/office/drawing/2010/main">
+                <a:solidFill>
+                  <a:srgbClr val="FFFFFF"/>
+                </a:solidFill>
+              </a14:hiddenFill>
+            </a:ext>
+          </a:extLst>
+        </p:spPr>
+      </p:pic>
+      <p:cxnSp>
+        <p:nvCxnSpPr>
+          <p:cNvPr id="55" name="Connector: Elbow 54">
+            <a:extLst>
+              <a:ext uri="{FF2B5EF4-FFF2-40B4-BE49-F238E27FC236}">
+                <a16:creationId xmlns:a16="http://schemas.microsoft.com/office/drawing/2014/main" id="{45E59D52-1667-4E38-AF20-EC6C1261445B}"/>
+              </a:ext>
+            </a:extLst>
+          </p:cNvPr>
+          <p:cNvCxnSpPr>
+            <a:cxnSpLocks/>
+          </p:cNvCxnSpPr>
+          <p:nvPr/>
+        </p:nvCxnSpPr>
+        <p:spPr>
+          <a:xfrm>
+            <a:off x="2303620" y="4016774"/>
+            <a:ext cx="900432" cy="1088525"/>
+          </a:xfrm>
+          <a:prstGeom prst="bentConnector2">
+            <a:avLst/>
+          </a:prstGeom>
+          <a:ln w="28575">
+            <a:solidFill>
               <a:schemeClr val="tx1"/>
-            </a:fontRef>
-          </p:style>
-        </p:cxnSp>
-        <p:grpSp>
-          <p:nvGrpSpPr>
-            <p:cNvPr id="103" name="Group 102">
-              <a:extLst>
-                <a:ext uri="{FF2B5EF4-FFF2-40B4-BE49-F238E27FC236}">
-                  <a16:creationId xmlns:a16="http://schemas.microsoft.com/office/drawing/2014/main" id="{13262148-766A-41CE-A473-9A649EF5897B}"/>
-                </a:ext>
-              </a:extLst>
-            </p:cNvPr>
-            <p:cNvGrpSpPr/>
-            <p:nvPr/>
-          </p:nvGrpSpPr>
-          <p:grpSpPr>
-            <a:xfrm>
-              <a:off x="4232594" y="4481407"/>
-              <a:ext cx="2494750" cy="1758923"/>
-              <a:chOff x="4632359" y="8690050"/>
-              <a:chExt cx="2494750" cy="1758923"/>
-            </a:xfrm>
-          </p:grpSpPr>
-          <p:sp>
-            <p:nvSpPr>
-              <p:cNvPr id="115" name="Rectangle 114">
-                <a:extLst>
-                  <a:ext uri="{FF2B5EF4-FFF2-40B4-BE49-F238E27FC236}">
-                    <a16:creationId xmlns:a16="http://schemas.microsoft.com/office/drawing/2014/main" id="{F07B2C36-6850-40B4-955B-E642B048946D}"/>
-                  </a:ext>
-                </a:extLst>
-              </p:cNvPr>
-              <p:cNvSpPr/>
-              <p:nvPr/>
-            </p:nvSpPr>
-            <p:spPr>
-              <a:xfrm>
-                <a:off x="4632359" y="8690050"/>
-                <a:ext cx="2455353" cy="1758923"/>
-              </a:xfrm>
-              <a:prstGeom prst="rect">
-                <a:avLst/>
-              </a:prstGeom>
-              <a:solidFill>
-                <a:schemeClr val="bg1">
-                  <a:lumMod val="95000"/>
-                </a:schemeClr>
-              </a:solidFill>
-              <a:ln w="38100">
-                <a:solidFill>
-                  <a:schemeClr val="bg1">
-                    <a:lumMod val="75000"/>
-                  </a:schemeClr>
-                </a:solidFill>
-              </a:ln>
-            </p:spPr>
-            <p:style>
-              <a:lnRef idx="2">
-                <a:schemeClr val="accent1">
-                  <a:shade val="50000"/>
-                </a:schemeClr>
-              </a:lnRef>
-              <a:fillRef idx="1">
-                <a:schemeClr val="accent1"/>
-              </a:fillRef>
-              <a:effectRef idx="0">
-                <a:schemeClr val="accent1"/>
-              </a:effectRef>
-              <a:fontRef idx="minor">
-                <a:schemeClr val="lt1"/>
-              </a:fontRef>
-            </p:style>
-            <p:txBody>
-              <a:bodyPr lIns="72000" tIns="0" rIns="0" bIns="0" rtlCol="0" anchor="t" anchorCtr="0"/>
-              <a:lstStyle/>
-              <a:p>
-                <a:r>
-                  <a:rPr lang="en-GB" dirty="0">
-                    <a:solidFill>
-                      <a:schemeClr val="tx1"/>
-                    </a:solidFill>
-                  </a:rPr>
-                  <a:t>Generate key</a:t>
-                </a:r>
-              </a:p>
-              <a:p>
-                <a:r>
-                  <a:rPr lang="en-GB" dirty="0">
-                    <a:solidFill>
-                      <a:schemeClr val="tx1"/>
-                    </a:solidFill>
-                  </a:rPr>
-                  <a:t>statistics, plots, </a:t>
-                </a:r>
-              </a:p>
-              <a:p>
-                <a:r>
-                  <a:rPr lang="en-GB" dirty="0">
-                    <a:solidFill>
-                      <a:schemeClr val="tx1"/>
-                    </a:solidFill>
-                  </a:rPr>
-                  <a:t>and monthly</a:t>
-                </a:r>
-              </a:p>
-              <a:p>
-                <a:r>
-                  <a:rPr lang="en-GB" dirty="0">
-                    <a:solidFill>
-                      <a:schemeClr val="tx1"/>
-                    </a:solidFill>
-                  </a:rPr>
-                  <a:t>report</a:t>
-                </a:r>
-              </a:p>
-            </p:txBody>
-          </p:sp>
-          <p:pic>
-            <p:nvPicPr>
-              <p:cNvPr id="117" name="Picture 8" descr="Microsoft Word logo and symbol, meaning, history, PNG">
-                <a:extLst>
-                  <a:ext uri="{FF2B5EF4-FFF2-40B4-BE49-F238E27FC236}">
-                    <a16:creationId xmlns:a16="http://schemas.microsoft.com/office/drawing/2014/main" id="{393CFE93-7358-4657-A9BC-8C7FD14296D5}"/>
-                  </a:ext>
-                </a:extLst>
-              </p:cNvPr>
-              <p:cNvPicPr>
-                <a:picLocks noChangeAspect="1" noChangeArrowheads="1"/>
-              </p:cNvPicPr>
-              <p:nvPr/>
-            </p:nvPicPr>
-            <p:blipFill rotWithShape="1">
-              <a:blip r:embed="rId7">
-                <a:extLst>
-                  <a:ext uri="{28A0092B-C50C-407E-A947-70E740481C1C}">
-                    <a14:useLocalDpi xmlns:a14="http://schemas.microsoft.com/office/drawing/2010/main" val="0"/>
-                  </a:ext>
-                </a:extLst>
-              </a:blip>
-              <a:srcRect l="13020" r="13862"/>
-              <a:stretch/>
-            </p:blipFill>
-            <p:spPr bwMode="auto">
-              <a:xfrm>
-                <a:off x="6159343" y="9574193"/>
-                <a:ext cx="967766" cy="827226"/>
-              </a:xfrm>
-              <a:prstGeom prst="rect">
-                <a:avLst/>
-              </a:prstGeom>
-              <a:noFill/>
-              <a:extLst>
-                <a:ext uri="{909E8E84-426E-40DD-AFC4-6F175D3DCCD1}">
-                  <a14:hiddenFill xmlns:a14="http://schemas.microsoft.com/office/drawing/2010/main">
-                    <a:solidFill>
-                      <a:srgbClr val="FFFFFF"/>
-                    </a:solidFill>
-                  </a14:hiddenFill>
-                </a:ext>
-              </a:extLst>
-            </p:spPr>
-          </p:pic>
-          <p:pic>
-            <p:nvPicPr>
-              <p:cNvPr id="120" name="Picture 4" descr="Hello, R Markdown!">
-                <a:extLst>
-                  <a:ext uri="{FF2B5EF4-FFF2-40B4-BE49-F238E27FC236}">
-                    <a16:creationId xmlns:a16="http://schemas.microsoft.com/office/drawing/2014/main" id="{82FA6D05-3B3E-46A4-82FC-D602A20D992C}"/>
-                  </a:ext>
-                </a:extLst>
-              </p:cNvPr>
-              <p:cNvPicPr>
-                <a:picLocks noChangeAspect="1" noChangeArrowheads="1"/>
-              </p:cNvPicPr>
-              <p:nvPr/>
-            </p:nvPicPr>
-            <p:blipFill>
-              <a:blip r:embed="rId8">
-                <a:extLst>
-                  <a:ext uri="{28A0092B-C50C-407E-A947-70E740481C1C}">
-                    <a14:useLocalDpi xmlns:a14="http://schemas.microsoft.com/office/drawing/2010/main" val="0"/>
-                  </a:ext>
-                </a:extLst>
-              </a:blip>
-              <a:srcRect/>
-              <a:stretch>
-                <a:fillRect/>
-              </a:stretch>
-            </p:blipFill>
-            <p:spPr bwMode="auto">
-              <a:xfrm>
-                <a:off x="6337563" y="8739269"/>
-                <a:ext cx="715664" cy="829532"/>
-              </a:xfrm>
-              <a:prstGeom prst="rect">
-                <a:avLst/>
-              </a:prstGeom>
-              <a:noFill/>
-              <a:extLst>
-                <a:ext uri="{909E8E84-426E-40DD-AFC4-6F175D3DCCD1}">
-                  <a14:hiddenFill xmlns:a14="http://schemas.microsoft.com/office/drawing/2010/main">
-                    <a:solidFill>
-                      <a:srgbClr val="FFFFFF"/>
-                    </a:solidFill>
-                  </a14:hiddenFill>
-                </a:ext>
-              </a:extLst>
-            </p:spPr>
-          </p:pic>
-        </p:grpSp>
-        <p:grpSp>
-          <p:nvGrpSpPr>
-            <p:cNvPr id="102" name="Group 101">
-              <a:extLst>
-                <a:ext uri="{FF2B5EF4-FFF2-40B4-BE49-F238E27FC236}">
-                  <a16:creationId xmlns:a16="http://schemas.microsoft.com/office/drawing/2014/main" id="{8C4D394D-04C5-4C05-9B20-45395EE88467}"/>
-                </a:ext>
-              </a:extLst>
-            </p:cNvPr>
-            <p:cNvGrpSpPr/>
-            <p:nvPr/>
-          </p:nvGrpSpPr>
-          <p:grpSpPr>
-            <a:xfrm>
-              <a:off x="6814947" y="4481408"/>
-              <a:ext cx="2455353" cy="1609256"/>
-              <a:chOff x="7214712" y="8690051"/>
-              <a:chExt cx="2455353" cy="1609256"/>
-            </a:xfrm>
-          </p:grpSpPr>
-          <p:grpSp>
-            <p:nvGrpSpPr>
-              <p:cNvPr id="111" name="Group 110">
-                <a:extLst>
-                  <a:ext uri="{FF2B5EF4-FFF2-40B4-BE49-F238E27FC236}">
-                    <a16:creationId xmlns:a16="http://schemas.microsoft.com/office/drawing/2014/main" id="{F69F82D5-9337-4698-9129-1784F722D539}"/>
-                  </a:ext>
-                </a:extLst>
-              </p:cNvPr>
-              <p:cNvGrpSpPr/>
-              <p:nvPr/>
-            </p:nvGrpSpPr>
-            <p:grpSpPr>
-              <a:xfrm>
-                <a:off x="7214712" y="8690051"/>
-                <a:ext cx="2455353" cy="1609256"/>
-                <a:chOff x="6315421" y="2132873"/>
-                <a:chExt cx="2455353" cy="1609256"/>
-              </a:xfrm>
-              <a:solidFill>
-                <a:schemeClr val="bg1">
-                  <a:lumMod val="95000"/>
-                </a:schemeClr>
-              </a:solidFill>
-            </p:grpSpPr>
-            <p:sp>
-              <p:nvSpPr>
-                <p:cNvPr id="112" name="Rectangle 111">
-                  <a:extLst>
-                    <a:ext uri="{FF2B5EF4-FFF2-40B4-BE49-F238E27FC236}">
-                      <a16:creationId xmlns:a16="http://schemas.microsoft.com/office/drawing/2014/main" id="{C3496FBB-3FA5-4BC5-B62D-2688A37B7D89}"/>
-                    </a:ext>
-                  </a:extLst>
-                </p:cNvPr>
-                <p:cNvSpPr/>
-                <p:nvPr/>
-              </p:nvSpPr>
-              <p:spPr>
-                <a:xfrm>
-                  <a:off x="6315421" y="2132873"/>
-                  <a:ext cx="2455353" cy="1609256"/>
-                </a:xfrm>
-                <a:prstGeom prst="rect">
-                  <a:avLst/>
-                </a:prstGeom>
-                <a:grpFill/>
-                <a:ln w="38100">
-                  <a:solidFill>
-                    <a:schemeClr val="bg1">
-                      <a:lumMod val="75000"/>
-                    </a:schemeClr>
-                  </a:solidFill>
-                </a:ln>
-              </p:spPr>
-              <p:style>
-                <a:lnRef idx="2">
-                  <a:schemeClr val="accent1">
-                    <a:shade val="50000"/>
-                  </a:schemeClr>
-                </a:lnRef>
-                <a:fillRef idx="1">
-                  <a:schemeClr val="accent1"/>
-                </a:fillRef>
-                <a:effectRef idx="0">
-                  <a:schemeClr val="accent1"/>
-                </a:effectRef>
-                <a:fontRef idx="minor">
-                  <a:schemeClr val="lt1"/>
-                </a:fontRef>
-              </p:style>
-              <p:txBody>
-                <a:bodyPr lIns="72000" tIns="0" rIns="0" bIns="0" rtlCol="0" anchor="t" anchorCtr="0"/>
-                <a:lstStyle/>
-                <a:p>
-                  <a:r>
-                    <a:rPr lang="en-GB" dirty="0">
-                      <a:solidFill>
-                        <a:schemeClr val="tx1"/>
-                      </a:solidFill>
-                    </a:rPr>
-                    <a:t>Generate 14</a:t>
-                  </a:r>
-                </a:p>
-                <a:p>
-                  <a:r>
-                    <a:rPr lang="en-GB" dirty="0">
-                      <a:solidFill>
-                        <a:schemeClr val="tx1"/>
-                      </a:solidFill>
-                    </a:rPr>
-                    <a:t>summary tables</a:t>
-                  </a:r>
-                </a:p>
-                <a:p>
-                  <a:r>
-                    <a:rPr lang="en-GB" dirty="0">
-                      <a:solidFill>
-                        <a:schemeClr val="tx1"/>
-                      </a:solidFill>
-                    </a:rPr>
-                    <a:t>of key statistics</a:t>
-                  </a:r>
-                </a:p>
-              </p:txBody>
-            </p:sp>
-            <p:pic>
-              <p:nvPicPr>
-                <p:cNvPr id="113" name="Picture 2" descr="Microsoft Excel - Wikipedia">
-                  <a:extLst>
-                    <a:ext uri="{FF2B5EF4-FFF2-40B4-BE49-F238E27FC236}">
-                      <a16:creationId xmlns:a16="http://schemas.microsoft.com/office/drawing/2014/main" id="{C9B8F817-65B8-4796-A3B3-98CF0ECC7D7E}"/>
-                    </a:ext>
-                  </a:extLst>
-                </p:cNvPr>
-                <p:cNvPicPr>
-                  <a:picLocks noChangeAspect="1" noChangeArrowheads="1"/>
-                </p:cNvPicPr>
-                <p:nvPr/>
-              </p:nvPicPr>
-              <p:blipFill>
-                <a:blip r:embed="rId4">
-                  <a:clrChange>
-                    <a:clrFrom>
-                      <a:srgbClr val="000000">
-                        <a:alpha val="0"/>
-                      </a:srgbClr>
-                    </a:clrFrom>
-                    <a:clrTo>
-                      <a:srgbClr val="000000">
-                        <a:alpha val="0"/>
-                      </a:srgbClr>
-                    </a:clrTo>
-                  </a:clrChange>
-                  <a:extLst>
-                    <a:ext uri="{28A0092B-C50C-407E-A947-70E740481C1C}">
-                      <a14:useLocalDpi xmlns:a14="http://schemas.microsoft.com/office/drawing/2010/main" val="0"/>
-                    </a:ext>
-                  </a:extLst>
-                </a:blip>
-                <a:srcRect/>
-                <a:stretch>
-                  <a:fillRect/>
-                </a:stretch>
-              </p:blipFill>
-              <p:spPr bwMode="auto">
-                <a:xfrm>
-                  <a:off x="7921688" y="2918624"/>
-                  <a:ext cx="821093" cy="760235"/>
-                </a:xfrm>
-                <a:prstGeom prst="rect">
-                  <a:avLst/>
-                </a:prstGeom>
-                <a:grpFill/>
-                <a:ln>
-                  <a:noFill/>
-                </a:ln>
-              </p:spPr>
-            </p:pic>
-          </p:grpSp>
-          <p:pic>
-            <p:nvPicPr>
-              <p:cNvPr id="122" name="Graphic 121">
-                <a:extLst>
-                  <a:ext uri="{FF2B5EF4-FFF2-40B4-BE49-F238E27FC236}">
-                    <a16:creationId xmlns:a16="http://schemas.microsoft.com/office/drawing/2014/main" id="{E9D15A07-B463-4C61-9B9F-1F65C53F4F22}"/>
-                  </a:ext>
-                </a:extLst>
-              </p:cNvPr>
-              <p:cNvPicPr>
-                <a:picLocks noChangeAspect="1"/>
-              </p:cNvPicPr>
-              <p:nvPr/>
-            </p:nvPicPr>
-            <p:blipFill>
-              <a:blip r:embed="rId5">
-                <a:extLst>
-                  <a:ext uri="{28A0092B-C50C-407E-A947-70E740481C1C}">
-                    <a14:useLocalDpi xmlns:a14="http://schemas.microsoft.com/office/drawing/2010/main" val="0"/>
-                  </a:ext>
-                  <a:ext uri="{96DAC541-7B7A-43D3-8B79-37D633B846F1}">
-                    <asvg:svgBlip xmlns:asvg="http://schemas.microsoft.com/office/drawing/2016/SVG/main" r:embed="rId6"/>
-                  </a:ext>
-                </a:extLst>
-              </a:blip>
-              <a:stretch>
-                <a:fillRect/>
-              </a:stretch>
-            </p:blipFill>
-            <p:spPr>
-              <a:xfrm>
-                <a:off x="8755146" y="8747112"/>
-                <a:ext cx="887211" cy="687466"/>
-              </a:xfrm>
-              <a:prstGeom prst="rect">
-                <a:avLst/>
-              </a:prstGeom>
-            </p:spPr>
-          </p:pic>
-        </p:grpSp>
-        <p:cxnSp>
-          <p:nvCxnSpPr>
-            <p:cNvPr id="125" name="Straight Arrow Connector 124">
-              <a:extLst>
-                <a:ext uri="{FF2B5EF4-FFF2-40B4-BE49-F238E27FC236}">
-                  <a16:creationId xmlns:a16="http://schemas.microsoft.com/office/drawing/2014/main" id="{FFB910D4-539A-4AFE-8B55-20891505030F}"/>
-                </a:ext>
-              </a:extLst>
-            </p:cNvPr>
-            <p:cNvCxnSpPr>
-              <a:cxnSpLocks/>
-              <a:stCxn id="37" idx="2"/>
-            </p:cNvCxnSpPr>
-            <p:nvPr/>
-          </p:nvCxnSpPr>
-          <p:spPr>
-            <a:xfrm>
-              <a:off x="6757699" y="4014202"/>
-              <a:ext cx="0" cy="249869"/>
-            </a:xfrm>
-            <a:prstGeom prst="straightConnector1">
-              <a:avLst/>
-            </a:prstGeom>
-            <a:ln w="28575">
-              <a:solidFill>
-                <a:schemeClr val="tx1"/>
-              </a:solidFill>
-              <a:prstDash val="sysDash"/>
-              <a:headEnd type="none" w="med" len="med"/>
-              <a:tailEnd type="none" w="med" len="med"/>
-            </a:ln>
-          </p:spPr>
-          <p:style>
-            <a:lnRef idx="1">
-              <a:schemeClr val="accent1"/>
-            </a:lnRef>
-            <a:fillRef idx="0">
-              <a:schemeClr val="accent1"/>
-            </a:fillRef>
-            <a:effectRef idx="0">
-              <a:schemeClr val="accent1"/>
-            </a:effectRef>
-            <a:fontRef idx="minor">
-              <a:schemeClr val="tx1"/>
-            </a:fontRef>
-          </p:style>
-        </p:cxnSp>
-        <p:grpSp>
-          <p:nvGrpSpPr>
-            <p:cNvPr id="18" name="Group 17">
-              <a:extLst>
-                <a:ext uri="{FF2B5EF4-FFF2-40B4-BE49-F238E27FC236}">
-                  <a16:creationId xmlns:a16="http://schemas.microsoft.com/office/drawing/2014/main" id="{14C76C3D-AD51-44C1-B84E-ADF2CC46950D}"/>
-                </a:ext>
-              </a:extLst>
-            </p:cNvPr>
-            <p:cNvGrpSpPr/>
-            <p:nvPr/>
-          </p:nvGrpSpPr>
-          <p:grpSpPr>
-            <a:xfrm>
-              <a:off x="884716" y="2646580"/>
-              <a:ext cx="1418904" cy="1660721"/>
-              <a:chOff x="1269916" y="3231922"/>
-              <a:chExt cx="1418904" cy="1660721"/>
-            </a:xfrm>
-          </p:grpSpPr>
-          <p:grpSp>
-            <p:nvGrpSpPr>
-              <p:cNvPr id="35" name="Group 34">
-                <a:extLst>
-                  <a:ext uri="{FF2B5EF4-FFF2-40B4-BE49-F238E27FC236}">
-                    <a16:creationId xmlns:a16="http://schemas.microsoft.com/office/drawing/2014/main" id="{BDE67903-C600-4C08-BCE1-E90B9B688678}"/>
-                  </a:ext>
-                </a:extLst>
-              </p:cNvPr>
-              <p:cNvGrpSpPr/>
-              <p:nvPr/>
-            </p:nvGrpSpPr>
-            <p:grpSpPr>
-              <a:xfrm>
-                <a:off x="1269916" y="3231922"/>
-                <a:ext cx="1418904" cy="1660721"/>
-                <a:chOff x="1275768" y="815003"/>
-                <a:chExt cx="1418904" cy="1660721"/>
-              </a:xfrm>
-            </p:grpSpPr>
-            <p:sp>
-              <p:nvSpPr>
-                <p:cNvPr id="36" name="Flowchart: Magnetic Disk 35">
-                  <a:extLst>
-                    <a:ext uri="{FF2B5EF4-FFF2-40B4-BE49-F238E27FC236}">
-                      <a16:creationId xmlns:a16="http://schemas.microsoft.com/office/drawing/2014/main" id="{27AC7B5B-573E-478E-B56F-24FABE7749B5}"/>
-                    </a:ext>
-                  </a:extLst>
-                </p:cNvPr>
-                <p:cNvSpPr/>
-                <p:nvPr/>
-              </p:nvSpPr>
-              <p:spPr>
-                <a:xfrm>
-                  <a:off x="1275770" y="1911296"/>
-                  <a:ext cx="1418902" cy="564428"/>
-                </a:xfrm>
-                <a:prstGeom prst="flowChartMagneticDisk">
-                  <a:avLst/>
-                </a:prstGeom>
-                <a:solidFill>
-                  <a:schemeClr val="bg1"/>
-                </a:solidFill>
-                <a:ln w="28575">
-                  <a:solidFill>
-                    <a:schemeClr val="accent2">
-                      <a:lumMod val="40000"/>
-                      <a:lumOff val="60000"/>
-                    </a:schemeClr>
-                  </a:solidFill>
-                </a:ln>
-              </p:spPr>
-              <p:style>
-                <a:lnRef idx="2">
-                  <a:schemeClr val="accent1">
-                    <a:shade val="50000"/>
-                  </a:schemeClr>
-                </a:lnRef>
-                <a:fillRef idx="1">
-                  <a:schemeClr val="accent1"/>
-                </a:fillRef>
-                <a:effectRef idx="0">
-                  <a:schemeClr val="accent1"/>
-                </a:effectRef>
-                <a:fontRef idx="minor">
-                  <a:schemeClr val="lt1"/>
-                </a:fontRef>
-              </p:style>
-              <p:txBody>
-                <a:bodyPr rtlCol="0" anchor="ctr"/>
-                <a:lstStyle/>
-                <a:p>
-                  <a:pPr algn="ctr"/>
-                  <a:endParaRPr lang="en-GB"/>
-                </a:p>
-              </p:txBody>
-            </p:sp>
-            <p:sp>
-              <p:nvSpPr>
-                <p:cNvPr id="38" name="Flowchart: Magnetic Disk 37">
-                  <a:extLst>
-                    <a:ext uri="{FF2B5EF4-FFF2-40B4-BE49-F238E27FC236}">
-                      <a16:creationId xmlns:a16="http://schemas.microsoft.com/office/drawing/2014/main" id="{6093DB97-C6E2-4823-9BA2-0054A769C1F0}"/>
-                    </a:ext>
-                  </a:extLst>
-                </p:cNvPr>
-                <p:cNvSpPr/>
-                <p:nvPr/>
-              </p:nvSpPr>
-              <p:spPr>
-                <a:xfrm>
-                  <a:off x="1275769" y="1545865"/>
-                  <a:ext cx="1418902" cy="564428"/>
-                </a:xfrm>
-                <a:prstGeom prst="flowChartMagneticDisk">
-                  <a:avLst/>
-                </a:prstGeom>
-                <a:solidFill>
-                  <a:schemeClr val="bg1"/>
-                </a:solidFill>
-                <a:ln w="28575">
-                  <a:solidFill>
-                    <a:schemeClr val="accent2">
-                      <a:lumMod val="40000"/>
-                      <a:lumOff val="60000"/>
-                    </a:schemeClr>
-                  </a:solidFill>
-                </a:ln>
-              </p:spPr>
-              <p:style>
-                <a:lnRef idx="2">
-                  <a:schemeClr val="accent1">
-                    <a:shade val="50000"/>
-                  </a:schemeClr>
-                </a:lnRef>
-                <a:fillRef idx="1">
-                  <a:schemeClr val="accent1"/>
-                </a:fillRef>
-                <a:effectRef idx="0">
-                  <a:schemeClr val="accent1"/>
-                </a:effectRef>
-                <a:fontRef idx="minor">
-                  <a:schemeClr val="lt1"/>
-                </a:fontRef>
-              </p:style>
-              <p:txBody>
-                <a:bodyPr rtlCol="0" anchor="ctr"/>
-                <a:lstStyle/>
-                <a:p>
-                  <a:pPr algn="ctr"/>
-                  <a:endParaRPr lang="en-GB"/>
-                </a:p>
-              </p:txBody>
-            </p:sp>
-            <p:sp>
-              <p:nvSpPr>
-                <p:cNvPr id="40" name="Flowchart: Magnetic Disk 39">
-                  <a:extLst>
-                    <a:ext uri="{FF2B5EF4-FFF2-40B4-BE49-F238E27FC236}">
-                      <a16:creationId xmlns:a16="http://schemas.microsoft.com/office/drawing/2014/main" id="{9D549A41-321E-4415-B490-E434ED311A00}"/>
-                    </a:ext>
-                  </a:extLst>
-                </p:cNvPr>
-                <p:cNvSpPr/>
-                <p:nvPr/>
-              </p:nvSpPr>
-              <p:spPr>
-                <a:xfrm>
-                  <a:off x="1275769" y="1180434"/>
-                  <a:ext cx="1418902" cy="564428"/>
-                </a:xfrm>
-                <a:prstGeom prst="flowChartMagneticDisk">
-                  <a:avLst/>
-                </a:prstGeom>
-                <a:solidFill>
-                  <a:schemeClr val="bg1"/>
-                </a:solidFill>
-                <a:ln w="28575">
-                  <a:solidFill>
-                    <a:schemeClr val="accent2">
-                      <a:lumMod val="40000"/>
-                      <a:lumOff val="60000"/>
-                    </a:schemeClr>
-                  </a:solidFill>
-                </a:ln>
-              </p:spPr>
-              <p:style>
-                <a:lnRef idx="2">
-                  <a:schemeClr val="accent1">
-                    <a:shade val="50000"/>
-                  </a:schemeClr>
-                </a:lnRef>
-                <a:fillRef idx="1">
-                  <a:schemeClr val="accent1"/>
-                </a:fillRef>
-                <a:effectRef idx="0">
-                  <a:schemeClr val="accent1"/>
-                </a:effectRef>
-                <a:fontRef idx="minor">
-                  <a:schemeClr val="lt1"/>
-                </a:fontRef>
-              </p:style>
-              <p:txBody>
-                <a:bodyPr rtlCol="0" anchor="ctr"/>
-                <a:lstStyle/>
-                <a:p>
-                  <a:pPr algn="ctr"/>
-                  <a:endParaRPr lang="en-GB"/>
-                </a:p>
-              </p:txBody>
-            </p:sp>
-            <p:sp>
-              <p:nvSpPr>
-                <p:cNvPr id="41" name="Flowchart: Magnetic Disk 40">
-                  <a:extLst>
-                    <a:ext uri="{FF2B5EF4-FFF2-40B4-BE49-F238E27FC236}">
-                      <a16:creationId xmlns:a16="http://schemas.microsoft.com/office/drawing/2014/main" id="{FF49D6AD-984B-459C-854D-29DF389746FE}"/>
-                    </a:ext>
-                  </a:extLst>
-                </p:cNvPr>
-                <p:cNvSpPr/>
-                <p:nvPr/>
-              </p:nvSpPr>
-              <p:spPr>
-                <a:xfrm>
-                  <a:off x="1275768" y="815003"/>
-                  <a:ext cx="1418902" cy="564428"/>
-                </a:xfrm>
-                <a:prstGeom prst="flowChartMagneticDisk">
-                  <a:avLst/>
-                </a:prstGeom>
-                <a:solidFill>
-                  <a:schemeClr val="bg1"/>
-                </a:solidFill>
-                <a:ln w="28575">
-                  <a:solidFill>
-                    <a:schemeClr val="accent2">
-                      <a:lumMod val="40000"/>
-                      <a:lumOff val="60000"/>
-                    </a:schemeClr>
-                  </a:solidFill>
-                </a:ln>
-              </p:spPr>
-              <p:style>
-                <a:lnRef idx="2">
-                  <a:schemeClr val="accent1">
-                    <a:shade val="50000"/>
-                  </a:schemeClr>
-                </a:lnRef>
-                <a:fillRef idx="1">
-                  <a:schemeClr val="accent1"/>
-                </a:fillRef>
-                <a:effectRef idx="0">
-                  <a:schemeClr val="accent1"/>
-                </a:effectRef>
-                <a:fontRef idx="minor">
-                  <a:schemeClr val="lt1"/>
-                </a:fontRef>
-              </p:style>
-              <p:txBody>
-                <a:bodyPr rtlCol="0" anchor="ctr"/>
-                <a:lstStyle/>
-                <a:p>
-                  <a:pPr algn="ctr"/>
-                  <a:endParaRPr lang="en-GB"/>
-                </a:p>
-              </p:txBody>
-            </p:sp>
-          </p:grpSp>
-          <p:pic>
-            <p:nvPicPr>
-              <p:cNvPr id="15" name="Picture 2" descr="Download MySQL Logo in SVG Vector or PNG File Format - Logo.wine">
-                <a:extLst>
-                  <a:ext uri="{FF2B5EF4-FFF2-40B4-BE49-F238E27FC236}">
-                    <a16:creationId xmlns:a16="http://schemas.microsoft.com/office/drawing/2014/main" id="{EB3D5306-3478-40BA-B9C4-EF420051D003}"/>
-                  </a:ext>
-                </a:extLst>
-              </p:cNvPr>
-              <p:cNvPicPr>
-                <a:picLocks noChangeAspect="1" noChangeArrowheads="1"/>
-              </p:cNvPicPr>
-              <p:nvPr/>
-            </p:nvPicPr>
-            <p:blipFill rotWithShape="1">
-              <a:blip r:embed="rId9">
-                <a:extLst>
-                  <a:ext uri="{28A0092B-C50C-407E-A947-70E740481C1C}">
-                    <a14:useLocalDpi xmlns:a14="http://schemas.microsoft.com/office/drawing/2010/main" val="0"/>
-                  </a:ext>
-                </a:extLst>
-              </a:blip>
-              <a:srcRect l="10150" t="18903" r="10355" b="18655"/>
-              <a:stretch/>
-            </p:blipFill>
-            <p:spPr bwMode="auto">
-              <a:xfrm>
-                <a:off x="1387105" y="3851632"/>
-                <a:ext cx="1184524" cy="620297"/>
-              </a:xfrm>
-              <a:prstGeom prst="rect">
-                <a:avLst/>
-              </a:prstGeom>
-              <a:noFill/>
-              <a:extLst>
-                <a:ext uri="{909E8E84-426E-40DD-AFC4-6F175D3DCCD1}">
-                  <a14:hiddenFill xmlns:a14="http://schemas.microsoft.com/office/drawing/2010/main">
-                    <a:solidFill>
-                      <a:srgbClr val="FFFFFF"/>
-                    </a:solidFill>
-                  </a14:hiddenFill>
-                </a:ext>
-              </a:extLst>
-            </p:spPr>
-          </p:pic>
-        </p:grpSp>
-        <p:cxnSp>
-          <p:nvCxnSpPr>
-            <p:cNvPr id="45" name="Straight Arrow Connector 44">
-              <a:extLst>
-                <a:ext uri="{FF2B5EF4-FFF2-40B4-BE49-F238E27FC236}">
-                  <a16:creationId xmlns:a16="http://schemas.microsoft.com/office/drawing/2014/main" id="{4F1450DC-6B82-4A30-9C67-970C6513797E}"/>
-                </a:ext>
-              </a:extLst>
-            </p:cNvPr>
-            <p:cNvCxnSpPr>
-              <a:cxnSpLocks/>
-              <a:stCxn id="5" idx="3"/>
-              <a:endCxn id="41" idx="1"/>
-            </p:cNvCxnSpPr>
-            <p:nvPr/>
-          </p:nvCxnSpPr>
-          <p:spPr>
-            <a:xfrm>
-              <a:off x="1591707" y="2278392"/>
-              <a:ext cx="2460" cy="368188"/>
-            </a:xfrm>
-            <a:prstGeom prst="straightConnector1">
-              <a:avLst/>
-            </a:prstGeom>
-            <a:ln w="28575">
-              <a:solidFill>
-                <a:schemeClr val="bg1">
-                  <a:lumMod val="75000"/>
-                </a:schemeClr>
-              </a:solidFill>
-              <a:prstDash val="sysDash"/>
-              <a:tailEnd type="triangle"/>
-            </a:ln>
-          </p:spPr>
-          <p:style>
-            <a:lnRef idx="1">
-              <a:schemeClr val="accent1"/>
-            </a:lnRef>
-            <a:fillRef idx="0">
-              <a:schemeClr val="accent1"/>
-            </a:fillRef>
-            <a:effectRef idx="0">
-              <a:schemeClr val="accent1"/>
-            </a:effectRef>
-            <a:fontRef idx="minor">
-              <a:schemeClr val="tx1"/>
-            </a:fontRef>
-          </p:style>
-        </p:cxnSp>
-        <p:cxnSp>
-          <p:nvCxnSpPr>
-            <p:cNvPr id="49" name="Straight Arrow Connector 48">
-              <a:extLst>
-                <a:ext uri="{FF2B5EF4-FFF2-40B4-BE49-F238E27FC236}">
-                  <a16:creationId xmlns:a16="http://schemas.microsoft.com/office/drawing/2014/main" id="{6BCB1198-D1AF-46FE-AEB0-928CD1CB9EEA}"/>
-                </a:ext>
-              </a:extLst>
-            </p:cNvPr>
-            <p:cNvCxnSpPr>
-              <a:cxnSpLocks/>
-              <a:stCxn id="36" idx="3"/>
-              <a:endCxn id="58" idx="0"/>
-            </p:cNvCxnSpPr>
-            <p:nvPr/>
-          </p:nvCxnSpPr>
-          <p:spPr>
-            <a:xfrm flipH="1">
-              <a:off x="1591705" y="4307301"/>
-              <a:ext cx="2464" cy="806311"/>
-            </a:xfrm>
-            <a:prstGeom prst="straightConnector1">
-              <a:avLst/>
-            </a:prstGeom>
-            <a:ln w="28575">
-              <a:solidFill>
-                <a:schemeClr val="tx1"/>
-              </a:solidFill>
-              <a:prstDash val="sysDash"/>
-              <a:tailEnd type="triangle"/>
-            </a:ln>
-          </p:spPr>
-          <p:style>
-            <a:lnRef idx="1">
-              <a:schemeClr val="accent1"/>
-            </a:lnRef>
-            <a:fillRef idx="0">
-              <a:schemeClr val="accent1"/>
-            </a:fillRef>
-            <a:effectRef idx="0">
-              <a:schemeClr val="accent1"/>
-            </a:effectRef>
-            <a:fontRef idx="minor">
-              <a:schemeClr val="tx1"/>
-            </a:fontRef>
-          </p:style>
-        </p:cxnSp>
-        <p:cxnSp>
-          <p:nvCxnSpPr>
-            <p:cNvPr id="25" name="Connector: Elbow 24">
-              <a:extLst>
-                <a:ext uri="{FF2B5EF4-FFF2-40B4-BE49-F238E27FC236}">
-                  <a16:creationId xmlns:a16="http://schemas.microsoft.com/office/drawing/2014/main" id="{F2F948D1-B807-45C7-A768-CCB41895D6EE}"/>
-                </a:ext>
-              </a:extLst>
-            </p:cNvPr>
-            <p:cNvCxnSpPr>
-              <a:cxnSpLocks/>
-              <a:endCxn id="32" idx="2"/>
-            </p:cNvCxnSpPr>
-            <p:nvPr/>
-          </p:nvCxnSpPr>
-          <p:spPr>
-            <a:xfrm rot="10800000">
-              <a:off x="3656889" y="3695246"/>
-              <a:ext cx="1803383" cy="564429"/>
-            </a:xfrm>
-            <a:prstGeom prst="bentConnector2">
-              <a:avLst/>
-            </a:prstGeom>
-            <a:ln w="28575">
-              <a:solidFill>
-                <a:schemeClr val="tx1"/>
-              </a:solidFill>
-              <a:prstDash val="sysDash"/>
-              <a:tailEnd type="triangle"/>
-            </a:ln>
-          </p:spPr>
-          <p:style>
-            <a:lnRef idx="1">
-              <a:schemeClr val="accent1"/>
-            </a:lnRef>
-            <a:fillRef idx="0">
-              <a:schemeClr val="accent1"/>
-            </a:fillRef>
-            <a:effectRef idx="0">
-              <a:schemeClr val="accent1"/>
-            </a:effectRef>
-            <a:fontRef idx="minor">
-              <a:schemeClr val="tx1"/>
-            </a:fontRef>
-          </p:style>
-        </p:cxnSp>
-        <p:grpSp>
-          <p:nvGrpSpPr>
-            <p:cNvPr id="43" name="Group 42">
-              <a:extLst>
-                <a:ext uri="{FF2B5EF4-FFF2-40B4-BE49-F238E27FC236}">
-                  <a16:creationId xmlns:a16="http://schemas.microsoft.com/office/drawing/2014/main" id="{67FE742F-E6BA-4F81-9AE1-19C9A53DEF23}"/>
-                </a:ext>
-              </a:extLst>
-            </p:cNvPr>
-            <p:cNvGrpSpPr/>
-            <p:nvPr/>
-          </p:nvGrpSpPr>
-          <p:grpSpPr>
-            <a:xfrm>
-              <a:off x="2700496" y="2881169"/>
-              <a:ext cx="1912783" cy="814076"/>
-              <a:chOff x="3094009" y="3476036"/>
-              <a:chExt cx="1912783" cy="814076"/>
-            </a:xfrm>
-          </p:grpSpPr>
-          <p:sp>
-            <p:nvSpPr>
-              <p:cNvPr id="32" name="Rectangle 31">
-                <a:extLst>
-                  <a:ext uri="{FF2B5EF4-FFF2-40B4-BE49-F238E27FC236}">
-                    <a16:creationId xmlns:a16="http://schemas.microsoft.com/office/drawing/2014/main" id="{B3DA708F-CAF2-4CBA-9188-7C2314C4301C}"/>
-                  </a:ext>
-                </a:extLst>
-              </p:cNvPr>
-              <p:cNvSpPr/>
-              <p:nvPr/>
-            </p:nvSpPr>
-            <p:spPr>
-              <a:xfrm>
-                <a:off x="3094009" y="3476036"/>
-                <a:ext cx="1912783" cy="814076"/>
-              </a:xfrm>
-              <a:prstGeom prst="rect">
-                <a:avLst/>
-              </a:prstGeom>
-              <a:solidFill>
-                <a:schemeClr val="bg1">
-                  <a:lumMod val="95000"/>
-                </a:schemeClr>
-              </a:solidFill>
-              <a:ln w="38100">
-                <a:solidFill>
-                  <a:schemeClr val="bg1">
-                    <a:lumMod val="75000"/>
-                  </a:schemeClr>
-                </a:solidFill>
-              </a:ln>
-            </p:spPr>
-            <p:style>
-              <a:lnRef idx="2">
-                <a:schemeClr val="accent1">
-                  <a:shade val="50000"/>
-                </a:schemeClr>
-              </a:lnRef>
-              <a:fillRef idx="1">
-                <a:schemeClr val="accent1"/>
-              </a:fillRef>
-              <a:effectRef idx="0">
-                <a:schemeClr val="accent1"/>
-              </a:effectRef>
-              <a:fontRef idx="minor">
-                <a:schemeClr val="lt1"/>
-              </a:fontRef>
-            </p:style>
-            <p:txBody>
-              <a:bodyPr lIns="72000" tIns="0" rIns="0" bIns="0" rtlCol="0" anchor="t" anchorCtr="0"/>
-              <a:lstStyle/>
-              <a:p>
-                <a:r>
-                  <a:rPr lang="en-GB" dirty="0">
-                    <a:solidFill>
-                      <a:schemeClr val="tx1"/>
-                    </a:solidFill>
-                  </a:rPr>
-                  <a:t>Update </a:t>
-                </a:r>
-              </a:p>
-              <a:p>
-                <a:r>
-                  <a:rPr lang="en-GB" dirty="0">
-                    <a:solidFill>
-                      <a:schemeClr val="tx1"/>
-                    </a:solidFill>
-                  </a:rPr>
-                  <a:t>local data</a:t>
-                </a:r>
-              </a:p>
-              <a:p>
-                <a:r>
-                  <a:rPr lang="en-GB" dirty="0">
-                    <a:solidFill>
-                      <a:schemeClr val="tx1"/>
-                    </a:solidFill>
-                  </a:rPr>
-                  <a:t> store</a:t>
-                </a:r>
-              </a:p>
-            </p:txBody>
-          </p:sp>
-          <p:pic>
-            <p:nvPicPr>
-              <p:cNvPr id="61" name="Graphic 60">
-                <a:extLst>
-                  <a:ext uri="{FF2B5EF4-FFF2-40B4-BE49-F238E27FC236}">
-                    <a16:creationId xmlns:a16="http://schemas.microsoft.com/office/drawing/2014/main" id="{87742C57-9DBE-4A05-8DC0-AE545B54ECCB}"/>
-                  </a:ext>
-                </a:extLst>
-              </p:cNvPr>
-              <p:cNvPicPr>
-                <a:picLocks noChangeAspect="1"/>
-              </p:cNvPicPr>
-              <p:nvPr/>
-            </p:nvPicPr>
-            <p:blipFill>
-              <a:blip r:embed="rId5">
-                <a:extLst>
-                  <a:ext uri="{28A0092B-C50C-407E-A947-70E740481C1C}">
-                    <a14:useLocalDpi xmlns:a14="http://schemas.microsoft.com/office/drawing/2010/main" val="0"/>
-                  </a:ext>
-                  <a:ext uri="{96DAC541-7B7A-43D3-8B79-37D633B846F1}">
-                    <asvg:svgBlip xmlns:asvg="http://schemas.microsoft.com/office/drawing/2016/SVG/main" r:embed="rId6"/>
-                  </a:ext>
-                </a:extLst>
-              </a:blip>
-              <a:stretch>
-                <a:fillRect/>
-              </a:stretch>
-            </p:blipFill>
-            <p:spPr>
-              <a:xfrm>
-                <a:off x="4101286" y="3556163"/>
-                <a:ext cx="887211" cy="687466"/>
-              </a:xfrm>
-              <a:prstGeom prst="rect">
-                <a:avLst/>
-              </a:prstGeom>
-            </p:spPr>
-          </p:pic>
-        </p:grpSp>
-        <p:cxnSp>
-          <p:nvCxnSpPr>
-            <p:cNvPr id="63" name="Straight Arrow Connector 62">
-              <a:extLst>
-                <a:ext uri="{FF2B5EF4-FFF2-40B4-BE49-F238E27FC236}">
-                  <a16:creationId xmlns:a16="http://schemas.microsoft.com/office/drawing/2014/main" id="{2F2E8625-DE52-4DD5-9F70-F37B69C84310}"/>
-                </a:ext>
-              </a:extLst>
-            </p:cNvPr>
-            <p:cNvCxnSpPr>
-              <a:cxnSpLocks/>
-              <a:stCxn id="32" idx="1"/>
-              <a:endCxn id="40" idx="4"/>
-            </p:cNvCxnSpPr>
-            <p:nvPr/>
-          </p:nvCxnSpPr>
-          <p:spPr>
-            <a:xfrm flipH="1">
-              <a:off x="2303619" y="3288207"/>
-              <a:ext cx="396877" cy="6018"/>
-            </a:xfrm>
-            <a:prstGeom prst="straightConnector1">
-              <a:avLst/>
-            </a:prstGeom>
-            <a:ln w="28575">
-              <a:solidFill>
-                <a:schemeClr val="tx1"/>
-              </a:solidFill>
-              <a:prstDash val="sysDash"/>
-              <a:tailEnd type="triangle"/>
-            </a:ln>
-          </p:spPr>
-          <p:style>
-            <a:lnRef idx="1">
-              <a:schemeClr val="accent1"/>
-            </a:lnRef>
-            <a:fillRef idx="0">
-              <a:schemeClr val="accent1"/>
-            </a:fillRef>
-            <a:effectRef idx="0">
-              <a:schemeClr val="accent1"/>
-            </a:effectRef>
-            <a:fontRef idx="minor">
-              <a:schemeClr val="tx1"/>
-            </a:fontRef>
-          </p:style>
-        </p:cxnSp>
-      </p:grpSp>
+            </a:solidFill>
+            <a:prstDash val="sysDash"/>
+            <a:tailEnd type="triangle"/>
+          </a:ln>
+        </p:spPr>
+        <p:style>
+          <a:lnRef idx="1">
+            <a:schemeClr val="accent1"/>
+          </a:lnRef>
+          <a:fillRef idx="0">
+            <a:schemeClr val="accent1"/>
+          </a:fillRef>
+          <a:effectRef idx="0">
+            <a:schemeClr val="accent1"/>
+          </a:effectRef>
+          <a:fontRef idx="minor">
+            <a:schemeClr val="tx1"/>
+          </a:fontRef>
+        </p:style>
+      </p:cxnSp>
     </p:spTree>
     <p:extLst>
       <p:ext uri="{BB962C8B-B14F-4D97-AF65-F5344CB8AC3E}">

</xml_diff>